<commit_message>
Update Model class diagram (#111)
* Update Model class diagram

* Update multiplicity

* Replace tag with mod
</commit_message>
<xml_diff>
--- a/docs/diagrams/ModelComponentClassDiagram.pptx
+++ b/docs/diagrams/ModelComponentClassDiagram.pptx
@@ -208,7 +208,7 @@
           <a:p>
             <a:fld id="{F5CC4B3F-88C1-4FFA-B1B6-F41C21DC6924}" type="datetimeFigureOut">
               <a:rPr lang="en-US" smtClean="0"/>
-              <a:t>9/4/17</a:t>
+              <a:t>10/27/17</a:t>
             </a:fld>
             <a:endParaRPr lang="en-US"/>
           </a:p>
@@ -476,6 +476,90 @@
 </p:notesMaster>
 </file>
 
+<file path=ppt/notesSlides/notesSlide1.xml><?xml version="1.0" encoding="utf-8"?>
+<p:notes xmlns:a="http://schemas.openxmlformats.org/drawingml/2006/main" xmlns:r="http://schemas.openxmlformats.org/officeDocument/2006/relationships" xmlns:p="http://schemas.openxmlformats.org/presentationml/2006/main">
+  <p:cSld>
+    <p:spTree>
+      <p:nvGrpSpPr>
+        <p:cNvPr id="1" name=""/>
+        <p:cNvGrpSpPr/>
+        <p:nvPr/>
+      </p:nvGrpSpPr>
+      <p:grpSpPr>
+        <a:xfrm>
+          <a:off x="0" y="0"/>
+          <a:ext cx="0" cy="0"/>
+          <a:chOff x="0" y="0"/>
+          <a:chExt cx="0" cy="0"/>
+        </a:xfrm>
+      </p:grpSpPr>
+      <p:sp>
+        <p:nvSpPr>
+          <p:cNvPr id="2" name="Slide Image Placeholder 1"/>
+          <p:cNvSpPr>
+            <a:spLocks noGrp="1" noRot="1" noChangeAspect="1"/>
+          </p:cNvSpPr>
+          <p:nvPr>
+            <p:ph type="sldImg"/>
+          </p:nvPr>
+        </p:nvSpPr>
+        <p:spPr/>
+      </p:sp>
+      <p:sp>
+        <p:nvSpPr>
+          <p:cNvPr id="3" name="Notes Placeholder 2"/>
+          <p:cNvSpPr>
+            <a:spLocks noGrp="1"/>
+          </p:cNvSpPr>
+          <p:nvPr>
+            <p:ph type="body" idx="1"/>
+          </p:nvPr>
+        </p:nvSpPr>
+        <p:spPr/>
+        <p:txBody>
+          <a:bodyPr/>
+          <a:lstStyle/>
+          <a:p>
+            <a:endParaRPr lang="en-US" dirty="0"/>
+          </a:p>
+        </p:txBody>
+      </p:sp>
+      <p:sp>
+        <p:nvSpPr>
+          <p:cNvPr id="4" name="Slide Number Placeholder 3"/>
+          <p:cNvSpPr>
+            <a:spLocks noGrp="1"/>
+          </p:cNvSpPr>
+          <p:nvPr>
+            <p:ph type="sldNum" sz="quarter" idx="10"/>
+          </p:nvPr>
+        </p:nvSpPr>
+        <p:spPr/>
+        <p:txBody>
+          <a:bodyPr/>
+          <a:lstStyle/>
+          <a:p>
+            <a:fld id="{5A7AB025-77E3-4BD1-A2FD-B3183DBA47A3}" type="slidenum">
+              <a:rPr lang="en-US" smtClean="0"/>
+              <a:t>1</a:t>
+            </a:fld>
+            <a:endParaRPr lang="en-US"/>
+          </a:p>
+        </p:txBody>
+      </p:sp>
+    </p:spTree>
+    <p:extLst>
+      <p:ext uri="{BB962C8B-B14F-4D97-AF65-F5344CB8AC3E}">
+        <p14:creationId xmlns:p14="http://schemas.microsoft.com/office/powerpoint/2010/main" val="284220651"/>
+      </p:ext>
+    </p:extLst>
+  </p:cSld>
+  <p:clrMapOvr>
+    <a:masterClrMapping/>
+  </p:clrMapOvr>
+</p:notes>
+</file>
+
 <file path=ppt/slideLayouts/slideLayout1.xml><?xml version="1.0" encoding="utf-8"?>
 <p:sldLayout xmlns:a="http://schemas.openxmlformats.org/drawingml/2006/main" xmlns:r="http://schemas.openxmlformats.org/officeDocument/2006/relationships" xmlns:p="http://schemas.openxmlformats.org/presentationml/2006/main" type="title" preserve="1">
   <p:cSld name="Title Slide">
@@ -657,7 +741,7 @@
           <a:p>
             <a:fld id="{78C97017-6FC3-485B-9764-EAC9E56C1D49}" type="datetimeFigureOut">
               <a:rPr lang="en-US" smtClean="0"/>
-              <a:t>9/4/17</a:t>
+              <a:t>10/27/17</a:t>
             </a:fld>
             <a:endParaRPr lang="en-US"/>
           </a:p>
@@ -827,7 +911,7 @@
           <a:p>
             <a:fld id="{78C97017-6FC3-485B-9764-EAC9E56C1D49}" type="datetimeFigureOut">
               <a:rPr lang="en-US" smtClean="0"/>
-              <a:t>9/4/17</a:t>
+              <a:t>10/27/17</a:t>
             </a:fld>
             <a:endParaRPr lang="en-US"/>
           </a:p>
@@ -1007,7 +1091,7 @@
           <a:p>
             <a:fld id="{78C97017-6FC3-485B-9764-EAC9E56C1D49}" type="datetimeFigureOut">
               <a:rPr lang="en-US" smtClean="0"/>
-              <a:t>9/4/17</a:t>
+              <a:t>10/27/17</a:t>
             </a:fld>
             <a:endParaRPr lang="en-US"/>
           </a:p>
@@ -1177,7 +1261,7 @@
           <a:p>
             <a:fld id="{78C97017-6FC3-485B-9764-EAC9E56C1D49}" type="datetimeFigureOut">
               <a:rPr lang="en-US" smtClean="0"/>
-              <a:t>9/4/17</a:t>
+              <a:t>10/27/17</a:t>
             </a:fld>
             <a:endParaRPr lang="en-US"/>
           </a:p>
@@ -1423,7 +1507,7 @@
           <a:p>
             <a:fld id="{78C97017-6FC3-485B-9764-EAC9E56C1D49}" type="datetimeFigureOut">
               <a:rPr lang="en-US" smtClean="0"/>
-              <a:t>9/4/17</a:t>
+              <a:t>10/27/17</a:t>
             </a:fld>
             <a:endParaRPr lang="en-US"/>
           </a:p>
@@ -1711,7 +1795,7 @@
           <a:p>
             <a:fld id="{78C97017-6FC3-485B-9764-EAC9E56C1D49}" type="datetimeFigureOut">
               <a:rPr lang="en-US" smtClean="0"/>
-              <a:t>9/4/17</a:t>
+              <a:t>10/27/17</a:t>
             </a:fld>
             <a:endParaRPr lang="en-US"/>
           </a:p>
@@ -2133,7 +2217,7 @@
           <a:p>
             <a:fld id="{78C97017-6FC3-485B-9764-EAC9E56C1D49}" type="datetimeFigureOut">
               <a:rPr lang="en-US" smtClean="0"/>
-              <a:t>9/4/17</a:t>
+              <a:t>10/27/17</a:t>
             </a:fld>
             <a:endParaRPr lang="en-US"/>
           </a:p>
@@ -2251,7 +2335,7 @@
           <a:p>
             <a:fld id="{78C97017-6FC3-485B-9764-EAC9E56C1D49}" type="datetimeFigureOut">
               <a:rPr lang="en-US" smtClean="0"/>
-              <a:t>9/4/17</a:t>
+              <a:t>10/27/17</a:t>
             </a:fld>
             <a:endParaRPr lang="en-US"/>
           </a:p>
@@ -2346,7 +2430,7 @@
           <a:p>
             <a:fld id="{78C97017-6FC3-485B-9764-EAC9E56C1D49}" type="datetimeFigureOut">
               <a:rPr lang="en-US" smtClean="0"/>
-              <a:t>9/4/17</a:t>
+              <a:t>10/27/17</a:t>
             </a:fld>
             <a:endParaRPr lang="en-US"/>
           </a:p>
@@ -2623,7 +2707,7 @@
           <a:p>
             <a:fld id="{78C97017-6FC3-485B-9764-EAC9E56C1D49}" type="datetimeFigureOut">
               <a:rPr lang="en-US" smtClean="0"/>
-              <a:t>9/4/17</a:t>
+              <a:t>10/27/17</a:t>
             </a:fld>
             <a:endParaRPr lang="en-US"/>
           </a:p>
@@ -2876,7 +2960,7 @@
           <a:p>
             <a:fld id="{78C97017-6FC3-485B-9764-EAC9E56C1D49}" type="datetimeFigureOut">
               <a:rPr lang="en-US" smtClean="0"/>
-              <a:t>9/4/17</a:t>
+              <a:t>10/27/17</a:t>
             </a:fld>
             <a:endParaRPr lang="en-US"/>
           </a:p>
@@ -3089,7 +3173,7 @@
           <a:p>
             <a:fld id="{78C97017-6FC3-485B-9764-EAC9E56C1D49}" type="datetimeFigureOut">
               <a:rPr lang="en-US" smtClean="0"/>
-              <a:t>9/4/17</a:t>
+              <a:t>10/27/17</a:t>
             </a:fld>
             <a:endParaRPr lang="en-US"/>
           </a:p>
@@ -3472,8 +3556,8 @@
         </p:nvSpPr>
         <p:spPr>
           <a:xfrm>
-            <a:off x="1119865" y="1727200"/>
-            <a:ext cx="7490735" cy="2997200"/>
+            <a:off x="228600" y="1547164"/>
+            <a:ext cx="8649969" cy="3120125"/>
           </a:xfrm>
           <a:prstGeom prst="roundRect">
             <a:avLst>
@@ -3533,8 +3617,8 @@
         </p:nvSpPr>
         <p:spPr>
           <a:xfrm>
-            <a:off x="2877180" y="3158440"/>
-            <a:ext cx="1093635" cy="346760"/>
+            <a:off x="2192019" y="3085002"/>
+            <a:ext cx="1093635" cy="352637"/>
           </a:xfrm>
           <a:prstGeom prst="rect">
             <a:avLst/>
@@ -3592,8 +3676,8 @@
         </p:nvSpPr>
         <p:spPr>
           <a:xfrm rot="16200000">
-            <a:off x="1683963" y="2868687"/>
-            <a:ext cx="1093635" cy="346760"/>
+            <a:off x="1051946" y="2769943"/>
+            <a:ext cx="1112171" cy="346760"/>
           </a:xfrm>
           <a:prstGeom prst="rect">
             <a:avLst/>
@@ -3653,8 +3737,8 @@
         </p:nvCxnSpPr>
         <p:spPr>
           <a:xfrm flipV="1">
-            <a:off x="6477000" y="3194131"/>
-            <a:ext cx="95385" cy="416514"/>
+            <a:off x="5868561" y="3136745"/>
+            <a:ext cx="110051" cy="406286"/>
           </a:xfrm>
           <a:prstGeom prst="bentConnector2">
             <a:avLst/>
@@ -3684,50 +3768,6 @@
           </a:fontRef>
         </p:style>
       </p:cxnSp>
-      <p:cxnSp>
-        <p:nvCxnSpPr>
-          <p:cNvPr id="107" name="Elbow Connector 106"/>
-          <p:cNvCxnSpPr>
-            <a:stCxn id="9" idx="1"/>
-          </p:cNvCxnSpPr>
-          <p:nvPr/>
-        </p:nvCxnSpPr>
-        <p:spPr>
-          <a:xfrm rot="5400000" flipH="1" flipV="1">
-            <a:off x="4360065" y="1080909"/>
-            <a:ext cx="378691" cy="4637261"/>
-          </a:xfrm>
-          <a:prstGeom prst="bentConnector4">
-            <a:avLst>
-              <a:gd name="adj1" fmla="val -101829"/>
-              <a:gd name="adj2" fmla="val 99976"/>
-            </a:avLst>
-          </a:prstGeom>
-          <a:ln w="19050">
-            <a:solidFill>
-              <a:srgbClr val="7030A0"/>
-            </a:solidFill>
-            <a:prstDash val="solid"/>
-            <a:headEnd type="none" w="med" len="med"/>
-            <a:tailEnd type="arrow" w="med" len="med"/>
-          </a:ln>
-          <a:effectLst/>
-        </p:spPr>
-        <p:style>
-          <a:lnRef idx="1">
-            <a:schemeClr val="accent2"/>
-          </a:lnRef>
-          <a:fillRef idx="2">
-            <a:schemeClr val="accent2"/>
-          </a:fillRef>
-          <a:effectRef idx="1">
-            <a:schemeClr val="accent2"/>
-          </a:effectRef>
-          <a:fontRef idx="minor">
-            <a:schemeClr val="dk1"/>
-          </a:fontRef>
-        </p:style>
-      </p:cxnSp>
       <p:sp>
         <p:nvSpPr>
           <p:cNvPr id="119" name="Rectangle 62"/>
@@ -3736,8 +3776,8 @@
         </p:nvSpPr>
         <p:spPr>
           <a:xfrm rot="16200000">
-            <a:off x="956202" y="2861202"/>
-            <a:ext cx="1093635" cy="346760"/>
+            <a:off x="324185" y="2762458"/>
+            <a:ext cx="1112171" cy="346760"/>
           </a:xfrm>
           <a:prstGeom prst="rect">
             <a:avLst/>
@@ -3806,8 +3846,8 @@
         </p:nvSpPr>
         <p:spPr>
           <a:xfrm rot="16200000">
-            <a:off x="1626910" y="2952291"/>
-            <a:ext cx="270504" cy="175523"/>
+            <a:off x="1016180" y="2884677"/>
+            <a:ext cx="275089" cy="175521"/>
           </a:xfrm>
           <a:prstGeom prst="triangle">
             <a:avLst/>
@@ -3855,9 +3895,9 @@
           <p:nvPr/>
         </p:nvCxnSpPr>
         <p:spPr>
-          <a:xfrm>
-            <a:off x="2656370" y="3326536"/>
-            <a:ext cx="220810" cy="5284"/>
+          <a:xfrm flipV="1">
+            <a:off x="2042873" y="3261321"/>
+            <a:ext cx="149146" cy="1273"/>
           </a:xfrm>
           <a:prstGeom prst="straightConnector1">
             <a:avLst/>
@@ -3894,8 +3934,8 @@
         </p:nvSpPr>
         <p:spPr>
           <a:xfrm rot="5400000" flipV="1">
-            <a:off x="6253986" y="3522883"/>
-            <a:ext cx="270504" cy="175523"/>
+            <a:off x="5643257" y="3455270"/>
+            <a:ext cx="275087" cy="175521"/>
           </a:xfrm>
           <a:prstGeom prst="triangle">
             <a:avLst/>
@@ -3945,8 +3985,8 @@
         </p:nvCxnSpPr>
         <p:spPr>
           <a:xfrm>
-            <a:off x="910091" y="3040053"/>
-            <a:ext cx="419548" cy="2860"/>
+            <a:off x="281259" y="2982535"/>
+            <a:ext cx="419548" cy="2908"/>
           </a:xfrm>
           <a:prstGeom prst="bentConnector3">
             <a:avLst>
@@ -3989,9 +4029,9 @@
           <p:nvPr/>
         </p:nvCxnSpPr>
         <p:spPr>
-          <a:xfrm flipV="1">
-            <a:off x="1849924" y="3040052"/>
-            <a:ext cx="216105" cy="1"/>
+          <a:xfrm>
+            <a:off x="1241485" y="2972437"/>
+            <a:ext cx="230771" cy="10230"/>
           </a:xfrm>
           <a:prstGeom prst="line">
             <a:avLst/>
@@ -4029,8 +4069,8 @@
         </p:nvSpPr>
         <p:spPr>
           <a:xfrm>
-            <a:off x="2420322" y="3239846"/>
-            <a:ext cx="236048" cy="173380"/>
+            <a:off x="1806825" y="3174434"/>
+            <a:ext cx="236048" cy="176319"/>
           </a:xfrm>
           <a:prstGeom prst="flowChartDecision">
             <a:avLst/>
@@ -4074,8 +4114,8 @@
         </p:nvSpPr>
         <p:spPr>
           <a:xfrm>
-            <a:off x="2879490" y="2627420"/>
-            <a:ext cx="1093635" cy="346760"/>
+            <a:off x="2194329" y="2553982"/>
+            <a:ext cx="1093635" cy="352637"/>
           </a:xfrm>
           <a:prstGeom prst="rect">
             <a:avLst/>
@@ -4132,9 +4172,9 @@
           <p:nvPr/>
         </p:nvCxnSpPr>
         <p:spPr>
-          <a:xfrm>
-            <a:off x="2658680" y="2795516"/>
-            <a:ext cx="220810" cy="5284"/>
+          <a:xfrm flipV="1">
+            <a:off x="2045183" y="2730301"/>
+            <a:ext cx="149146" cy="1273"/>
           </a:xfrm>
           <a:prstGeom prst="straightConnector1">
             <a:avLst/>
@@ -4171,8 +4211,8 @@
         </p:nvSpPr>
         <p:spPr>
           <a:xfrm>
-            <a:off x="2422632" y="2708826"/>
-            <a:ext cx="236048" cy="173380"/>
+            <a:off x="1809135" y="2643414"/>
+            <a:ext cx="236048" cy="176319"/>
           </a:xfrm>
           <a:prstGeom prst="flowChartDecision">
             <a:avLst/>
@@ -4216,8 +4256,8 @@
         </p:nvSpPr>
         <p:spPr>
           <a:xfrm>
-            <a:off x="4487017" y="2847371"/>
-            <a:ext cx="1156969" cy="346760"/>
+            <a:off x="3859319" y="2775283"/>
+            <a:ext cx="1156969" cy="352637"/>
           </a:xfrm>
           <a:prstGeom prst="rect">
             <a:avLst/>
@@ -4272,8 +4312,8 @@
         </p:nvSpPr>
         <p:spPr>
           <a:xfrm>
-            <a:off x="3984303" y="2673991"/>
-            <a:ext cx="236048" cy="173380"/>
+            <a:off x="3298432" y="2652590"/>
+            <a:ext cx="236048" cy="176319"/>
           </a:xfrm>
           <a:prstGeom prst="flowChartDecision">
             <a:avLst/>
@@ -4314,19 +4354,18 @@
       <p:cxnSp>
         <p:nvCxnSpPr>
           <p:cNvPr id="30" name="Elbow Connector 29"/>
-          <p:cNvCxnSpPr>
-            <a:stCxn id="51" idx="3"/>
-            <a:endCxn id="49" idx="1"/>
-          </p:cNvCxnSpPr>
+          <p:cNvCxnSpPr/>
           <p:nvPr/>
         </p:nvCxnSpPr>
         <p:spPr>
           <a:xfrm>
-            <a:off x="4220351" y="2760681"/>
-            <a:ext cx="266666" cy="260070"/>
+            <a:off x="3319392" y="2747855"/>
+            <a:ext cx="540000" cy="210852"/>
           </a:xfrm>
           <a:prstGeom prst="bentConnector3">
-            <a:avLst/>
+            <a:avLst>
+              <a:gd name="adj1" fmla="val 47935"/>
+            </a:avLst>
           </a:prstGeom>
           <a:ln w="19050">
             <a:solidFill>
@@ -4360,8 +4399,8 @@
         </p:nvSpPr>
         <p:spPr>
           <a:xfrm>
-            <a:off x="4477328" y="2280569"/>
-            <a:ext cx="1156969" cy="346760"/>
+            <a:off x="3786875" y="2207131"/>
+            <a:ext cx="1156969" cy="352637"/>
           </a:xfrm>
           <a:prstGeom prst="rect">
             <a:avLst/>
@@ -4398,7 +4437,7 @@
                   <a:srgbClr val="7030A0"/>
                 </a:solidFill>
               </a:rPr>
-              <a:t>UniqueTagList</a:t>
+              <a:t>UniqueModList</a:t>
             </a:r>
             <a:endParaRPr lang="en-SG" sz="1050" dirty="0">
               <a:solidFill>
@@ -4412,20 +4451,17 @@
         <p:nvCxnSpPr>
           <p:cNvPr id="59" name="Elbow Connector 58"/>
           <p:cNvCxnSpPr>
-            <a:stCxn id="51" idx="3"/>
             <a:endCxn id="57" idx="1"/>
           </p:cNvCxnSpPr>
           <p:nvPr/>
         </p:nvCxnSpPr>
         <p:spPr>
-          <a:xfrm flipV="1">
-            <a:off x="4220351" y="2453949"/>
-            <a:ext cx="256977" cy="306732"/>
-          </a:xfrm>
-          <a:prstGeom prst="bentConnector3">
-            <a:avLst>
-              <a:gd name="adj1" fmla="val 50000"/>
-            </a:avLst>
+          <a:xfrm rot="5400000" flipH="1" flipV="1">
+            <a:off x="3509446" y="2458531"/>
+            <a:ext cx="352510" cy="202348"/>
+          </a:xfrm>
+          <a:prstGeom prst="bentConnector2">
+            <a:avLst/>
           </a:prstGeom>
           <a:ln w="19050">
             <a:solidFill>
@@ -4459,8 +4495,8 @@
         </p:nvSpPr>
         <p:spPr>
           <a:xfrm>
-            <a:off x="6313677" y="2858066"/>
-            <a:ext cx="708186" cy="346760"/>
+            <a:off x="5704448" y="2784249"/>
+            <a:ext cx="708186" cy="352637"/>
           </a:xfrm>
           <a:prstGeom prst="rect">
             <a:avLst/>
@@ -4515,8 +4551,8 @@
         </p:nvSpPr>
         <p:spPr>
           <a:xfrm>
-            <a:off x="5643227" y="2943979"/>
-            <a:ext cx="236048" cy="173380"/>
+            <a:off x="5029730" y="2878567"/>
+            <a:ext cx="236048" cy="176319"/>
           </a:xfrm>
           <a:prstGeom prst="flowChartDecision">
             <a:avLst/>
@@ -4562,11 +4598,11 @@
           <p:nvPr/>
         </p:nvCxnSpPr>
         <p:spPr>
-          <a:xfrm>
-            <a:off x="5879275" y="3030669"/>
-            <a:ext cx="434402" cy="777"/>
-          </a:xfrm>
-          <a:prstGeom prst="bentConnector3">
+          <a:xfrm flipV="1">
+            <a:off x="5265778" y="2960568"/>
+            <a:ext cx="438670" cy="6159"/>
+          </a:xfrm>
+          <a:prstGeom prst="straightConnector1">
             <a:avLst/>
           </a:prstGeom>
           <a:ln w="19050">
@@ -4601,8 +4637,8 @@
         </p:nvSpPr>
         <p:spPr>
           <a:xfrm>
-            <a:off x="5336105" y="1809332"/>
-            <a:ext cx="483700" cy="346760"/>
+            <a:off x="4701912" y="1735894"/>
+            <a:ext cx="483700" cy="352637"/>
           </a:xfrm>
           <a:prstGeom prst="rect">
             <a:avLst/>
@@ -4639,7 +4675,7 @@
                   <a:srgbClr val="7030A0"/>
                 </a:solidFill>
               </a:rPr>
-              <a:t>Tag</a:t>
+              <a:t>Mod</a:t>
             </a:r>
             <a:endParaRPr lang="en-SG" sz="1050" dirty="0">
               <a:solidFill>
@@ -4657,8 +4693,8 @@
         </p:nvSpPr>
         <p:spPr>
           <a:xfrm rot="16200000">
-            <a:off x="4921666" y="2066540"/>
-            <a:ext cx="236048" cy="173380"/>
+            <a:off x="4311405" y="2000227"/>
+            <a:ext cx="240049" cy="173382"/>
           </a:xfrm>
           <a:prstGeom prst="flowChartDecision">
             <a:avLst/>
@@ -4705,8 +4741,8 @@
         </p:nvCxnSpPr>
         <p:spPr>
           <a:xfrm rot="5400000" flipH="1" flipV="1">
-            <a:off x="5161650" y="1860752"/>
-            <a:ext cx="52494" cy="296415"/>
+            <a:off x="4539331" y="1804313"/>
+            <a:ext cx="54681" cy="270482"/>
           </a:xfrm>
           <a:prstGeom prst="bentConnector2">
             <a:avLst/>
@@ -4743,8 +4779,8 @@
         </p:nvSpPr>
         <p:spPr>
           <a:xfrm>
-            <a:off x="5128257" y="3429000"/>
-            <a:ext cx="1156969" cy="346760"/>
+            <a:off x="4503757" y="3343435"/>
+            <a:ext cx="1156969" cy="352637"/>
           </a:xfrm>
           <a:prstGeom prst="rect">
             <a:avLst/>
@@ -4814,8 +4850,8 @@
         </p:nvSpPr>
         <p:spPr>
           <a:xfrm>
-            <a:off x="7712397" y="2564238"/>
-            <a:ext cx="708186" cy="285783"/>
+            <a:off x="7054638" y="2493622"/>
+            <a:ext cx="765720" cy="290627"/>
           </a:xfrm>
           <a:prstGeom prst="rect">
             <a:avLst/>
@@ -4870,8 +4906,8 @@
         </p:nvSpPr>
         <p:spPr>
           <a:xfrm>
-            <a:off x="7041947" y="2948201"/>
-            <a:ext cx="236048" cy="173380"/>
+            <a:off x="6428525" y="2882649"/>
+            <a:ext cx="236048" cy="176319"/>
           </a:xfrm>
           <a:prstGeom prst="flowChartDecision">
             <a:avLst/>
@@ -4909,47 +4945,6 @@
           </a:p>
         </p:txBody>
       </p:sp>
-      <p:cxnSp>
-        <p:nvCxnSpPr>
-          <p:cNvPr id="79" name="Elbow Connector 78"/>
-          <p:cNvCxnSpPr>
-            <a:stCxn id="78" idx="3"/>
-            <a:endCxn id="76" idx="1"/>
-          </p:cNvCxnSpPr>
-          <p:nvPr/>
-        </p:nvCxnSpPr>
-        <p:spPr>
-          <a:xfrm flipV="1">
-            <a:off x="7277995" y="2707130"/>
-            <a:ext cx="434402" cy="327761"/>
-          </a:xfrm>
-          <a:prstGeom prst="bentConnector3">
-            <a:avLst/>
-          </a:prstGeom>
-          <a:ln w="19050">
-            <a:solidFill>
-              <a:srgbClr val="7030A0"/>
-            </a:solidFill>
-            <a:headEnd type="none" w="med" len="med"/>
-            <a:tailEnd type="arrow" w="med" len="med"/>
-          </a:ln>
-          <a:effectLst/>
-        </p:spPr>
-        <p:style>
-          <a:lnRef idx="1">
-            <a:schemeClr val="accent2"/>
-          </a:lnRef>
-          <a:fillRef idx="2">
-            <a:schemeClr val="accent2"/>
-          </a:fillRef>
-          <a:effectRef idx="1">
-            <a:schemeClr val="accent2"/>
-          </a:effectRef>
-          <a:fontRef idx="minor">
-            <a:schemeClr val="dk1"/>
-          </a:fontRef>
-        </p:style>
-      </p:cxnSp>
       <p:sp>
         <p:nvSpPr>
           <p:cNvPr id="80" name="Rectangle 8"/>
@@ -4958,8 +4953,8 @@
         </p:nvSpPr>
         <p:spPr>
           <a:xfrm>
-            <a:off x="7712397" y="2887216"/>
-            <a:ext cx="708186" cy="285783"/>
+            <a:off x="7054637" y="2816600"/>
+            <a:ext cx="765721" cy="290627"/>
           </a:xfrm>
           <a:prstGeom prst="rect">
             <a:avLst/>
@@ -4991,12 +4986,12 @@
           <a:p>
             <a:pPr algn="ctr"/>
             <a:r>
-              <a:rPr lang="en-US" sz="1050" dirty="0" smtClean="0">
+              <a:rPr lang="en-US" sz="1050" dirty="0" err="1" smtClean="0">
                 <a:solidFill>
                   <a:srgbClr val="7030A0"/>
                 </a:solidFill>
               </a:rPr>
-              <a:t>Phone</a:t>
+              <a:t>PhoneList</a:t>
             </a:r>
             <a:endParaRPr lang="en-SG" sz="1050" dirty="0">
               <a:solidFill>
@@ -5006,47 +5001,6 @@
           </a:p>
         </p:txBody>
       </p:sp>
-      <p:cxnSp>
-        <p:nvCxnSpPr>
-          <p:cNvPr id="81" name="Elbow Connector 80"/>
-          <p:cNvCxnSpPr>
-            <a:stCxn id="78" idx="3"/>
-            <a:endCxn id="80" idx="1"/>
-          </p:cNvCxnSpPr>
-          <p:nvPr/>
-        </p:nvCxnSpPr>
-        <p:spPr>
-          <a:xfrm flipV="1">
-            <a:off x="7277995" y="3030108"/>
-            <a:ext cx="434402" cy="4783"/>
-          </a:xfrm>
-          <a:prstGeom prst="bentConnector3">
-            <a:avLst/>
-          </a:prstGeom>
-          <a:ln w="19050">
-            <a:solidFill>
-              <a:srgbClr val="7030A0"/>
-            </a:solidFill>
-            <a:headEnd type="none" w="med" len="med"/>
-            <a:tailEnd type="arrow" w="med" len="med"/>
-          </a:ln>
-          <a:effectLst/>
-        </p:spPr>
-        <p:style>
-          <a:lnRef idx="1">
-            <a:schemeClr val="accent2"/>
-          </a:lnRef>
-          <a:fillRef idx="2">
-            <a:schemeClr val="accent2"/>
-          </a:fillRef>
-          <a:effectRef idx="1">
-            <a:schemeClr val="accent2"/>
-          </a:effectRef>
-          <a:fontRef idx="minor">
-            <a:schemeClr val="dk1"/>
-          </a:fontRef>
-        </p:style>
-      </p:cxnSp>
       <p:sp>
         <p:nvSpPr>
           <p:cNvPr id="83" name="Rectangle 8"/>
@@ -5055,8 +5009,8 @@
         </p:nvSpPr>
         <p:spPr>
           <a:xfrm>
-            <a:off x="7712397" y="3210194"/>
-            <a:ext cx="708186" cy="285783"/>
+            <a:off x="7054638" y="3139578"/>
+            <a:ext cx="765720" cy="290627"/>
           </a:xfrm>
           <a:prstGeom prst="rect">
             <a:avLst/>
@@ -5088,12 +5042,12 @@
           <a:p>
             <a:pPr algn="ctr"/>
             <a:r>
-              <a:rPr lang="en-US" sz="1050" dirty="0" smtClean="0">
+              <a:rPr lang="en-US" sz="1050" dirty="0" err="1" smtClean="0">
                 <a:solidFill>
                   <a:srgbClr val="7030A0"/>
                 </a:solidFill>
               </a:rPr>
-              <a:t>Email</a:t>
+              <a:t>EmailList</a:t>
             </a:r>
             <a:endParaRPr lang="en-SG" sz="1050" dirty="0">
               <a:solidFill>
@@ -5103,47 +5057,6 @@
           </a:p>
         </p:txBody>
       </p:sp>
-      <p:cxnSp>
-        <p:nvCxnSpPr>
-          <p:cNvPr id="84" name="Elbow Connector 83"/>
-          <p:cNvCxnSpPr>
-            <a:stCxn id="78" idx="3"/>
-            <a:endCxn id="83" idx="1"/>
-          </p:cNvCxnSpPr>
-          <p:nvPr/>
-        </p:nvCxnSpPr>
-        <p:spPr>
-          <a:xfrm>
-            <a:off x="7277995" y="3034891"/>
-            <a:ext cx="434402" cy="318195"/>
-          </a:xfrm>
-          <a:prstGeom prst="bentConnector3">
-            <a:avLst/>
-          </a:prstGeom>
-          <a:ln w="19050">
-            <a:solidFill>
-              <a:srgbClr val="7030A0"/>
-            </a:solidFill>
-            <a:headEnd type="none" w="med" len="med"/>
-            <a:tailEnd type="arrow" w="med" len="med"/>
-          </a:ln>
-          <a:effectLst/>
-        </p:spPr>
-        <p:style>
-          <a:lnRef idx="1">
-            <a:schemeClr val="accent2"/>
-          </a:lnRef>
-          <a:fillRef idx="2">
-            <a:schemeClr val="accent2"/>
-          </a:fillRef>
-          <a:effectRef idx="1">
-            <a:schemeClr val="accent2"/>
-          </a:effectRef>
-          <a:fontRef idx="minor">
-            <a:schemeClr val="dk1"/>
-          </a:fontRef>
-        </p:style>
-      </p:cxnSp>
       <p:sp>
         <p:nvSpPr>
           <p:cNvPr id="85" name="Rectangle 8"/>
@@ -5152,8 +5065,8 @@
         </p:nvSpPr>
         <p:spPr>
           <a:xfrm>
-            <a:off x="7712397" y="3533171"/>
-            <a:ext cx="708186" cy="285783"/>
+            <a:off x="7054638" y="3462555"/>
+            <a:ext cx="765720" cy="290627"/>
           </a:xfrm>
           <a:prstGeom prst="rect">
             <a:avLst/>
@@ -5202,47 +5115,6 @@
       </p:sp>
       <p:cxnSp>
         <p:nvCxnSpPr>
-          <p:cNvPr id="86" name="Elbow Connector 85"/>
-          <p:cNvCxnSpPr>
-            <a:stCxn id="78" idx="3"/>
-            <a:endCxn id="85" idx="1"/>
-          </p:cNvCxnSpPr>
-          <p:nvPr/>
-        </p:nvCxnSpPr>
-        <p:spPr>
-          <a:xfrm>
-            <a:off x="7277995" y="3034891"/>
-            <a:ext cx="434402" cy="641172"/>
-          </a:xfrm>
-          <a:prstGeom prst="bentConnector3">
-            <a:avLst/>
-          </a:prstGeom>
-          <a:ln w="19050">
-            <a:solidFill>
-              <a:srgbClr val="7030A0"/>
-            </a:solidFill>
-            <a:headEnd type="none" w="med" len="med"/>
-            <a:tailEnd type="arrow" w="med" len="med"/>
-          </a:ln>
-          <a:effectLst/>
-        </p:spPr>
-        <p:style>
-          <a:lnRef idx="1">
-            <a:schemeClr val="accent2"/>
-          </a:lnRef>
-          <a:fillRef idx="2">
-            <a:schemeClr val="accent2"/>
-          </a:fillRef>
-          <a:effectRef idx="1">
-            <a:schemeClr val="accent2"/>
-          </a:effectRef>
-          <a:fontRef idx="minor">
-            <a:schemeClr val="dk1"/>
-          </a:fontRef>
-        </p:style>
-      </p:cxnSp>
-      <p:cxnSp>
-        <p:nvCxnSpPr>
           <p:cNvPr id="97" name="Elbow Connector 63"/>
           <p:cNvCxnSpPr>
             <a:stCxn id="99" idx="3"/>
@@ -5251,8 +5123,8 @@
         </p:nvCxnSpPr>
         <p:spPr>
           <a:xfrm rot="16200000" flipH="1">
-            <a:off x="3279321" y="2485431"/>
-            <a:ext cx="293825" cy="1"/>
+            <a:off x="2671672" y="2414168"/>
+            <a:ext cx="298972" cy="22605"/>
           </a:xfrm>
           <a:prstGeom prst="bentConnector3">
             <a:avLst>
@@ -5292,8 +5164,8 @@
         </p:nvSpPr>
         <p:spPr>
           <a:xfrm rot="10800000" flipV="1">
-            <a:off x="3290981" y="2162997"/>
-            <a:ext cx="270504" cy="175523"/>
+            <a:off x="2674604" y="2097487"/>
+            <a:ext cx="270504" cy="178498"/>
           </a:xfrm>
           <a:prstGeom prst="triangle">
             <a:avLst/>
@@ -5340,8 +5212,8 @@
         </p:nvSpPr>
         <p:spPr>
           <a:xfrm>
-            <a:off x="2660303" y="1806470"/>
-            <a:ext cx="1539926" cy="346760"/>
+            <a:off x="1937848" y="1733032"/>
+            <a:ext cx="1539926" cy="352637"/>
           </a:xfrm>
           <a:prstGeom prst="rect">
             <a:avLst/>
@@ -5411,8 +5283,8 @@
         </p:nvSpPr>
         <p:spPr>
           <a:xfrm rot="16200000">
-            <a:off x="6527512" y="3586305"/>
-            <a:ext cx="881018" cy="261610"/>
+            <a:off x="5926832" y="3565267"/>
+            <a:ext cx="895950" cy="261610"/>
           </a:xfrm>
           <a:prstGeom prst="rect">
             <a:avLst/>
@@ -5450,8 +5322,8 @@
         </p:nvSpPr>
         <p:spPr>
           <a:xfrm>
-            <a:off x="2057401" y="4239491"/>
-            <a:ext cx="1066800" cy="346760"/>
+            <a:off x="1374482" y="4166053"/>
+            <a:ext cx="1066800" cy="352637"/>
           </a:xfrm>
           <a:prstGeom prst="rect">
             <a:avLst/>
@@ -5532,8 +5404,8 @@
         </p:nvCxnSpPr>
         <p:spPr>
           <a:xfrm rot="16200000" flipH="1">
-            <a:off x="1364475" y="3719944"/>
-            <a:ext cx="831471" cy="554381"/>
+            <a:off x="702152" y="3670042"/>
+            <a:ext cx="850448" cy="494211"/>
           </a:xfrm>
           <a:prstGeom prst="bentConnector2">
             <a:avLst/>
@@ -5574,8 +5446,8 @@
         </p:nvCxnSpPr>
         <p:spPr>
           <a:xfrm rot="16200000" flipV="1">
-            <a:off x="5948976" y="2139271"/>
-            <a:ext cx="404117" cy="1033473"/>
+            <a:off x="5300794" y="2026501"/>
+            <a:ext cx="400799" cy="1114697"/>
           </a:xfrm>
           <a:prstGeom prst="bentConnector2">
             <a:avLst/>
@@ -5612,8 +5484,8 @@
         </p:nvSpPr>
         <p:spPr>
           <a:xfrm>
-            <a:off x="4324972" y="2191228"/>
-            <a:ext cx="189257" cy="178683"/>
+            <a:off x="3602270" y="2141464"/>
+            <a:ext cx="189257" cy="181712"/>
           </a:xfrm>
           <a:prstGeom prst="rect">
             <a:avLst/>
@@ -5651,8 +5523,8 @@
         </p:nvSpPr>
         <p:spPr>
           <a:xfrm>
-            <a:off x="4324972" y="3058864"/>
-            <a:ext cx="189257" cy="178683"/>
+            <a:off x="3683838" y="2993207"/>
+            <a:ext cx="189257" cy="181712"/>
           </a:xfrm>
           <a:prstGeom prst="rect">
             <a:avLst/>
@@ -5690,8 +5562,8 @@
         </p:nvSpPr>
         <p:spPr>
           <a:xfrm>
-            <a:off x="5689761" y="2495413"/>
-            <a:ext cx="189257" cy="178683"/>
+            <a:off x="5080174" y="2429756"/>
+            <a:ext cx="189257" cy="181712"/>
           </a:xfrm>
           <a:prstGeom prst="rect">
             <a:avLst/>
@@ -5729,8 +5601,8 @@
         </p:nvSpPr>
         <p:spPr>
           <a:xfrm>
-            <a:off x="5163172" y="1778919"/>
-            <a:ext cx="189257" cy="178683"/>
+            <a:off x="4553585" y="1713262"/>
+            <a:ext cx="189257" cy="181712"/>
           </a:xfrm>
           <a:prstGeom prst="rect">
             <a:avLst/>
@@ -5768,8 +5640,8 @@
         </p:nvSpPr>
         <p:spPr>
           <a:xfrm>
-            <a:off x="6135256" y="3097917"/>
-            <a:ext cx="189257" cy="178683"/>
+            <a:off x="5525669" y="3032260"/>
+            <a:ext cx="189257" cy="181712"/>
           </a:xfrm>
           <a:prstGeom prst="rect">
             <a:avLst/>
@@ -5807,8 +5679,8 @@
         </p:nvSpPr>
         <p:spPr>
           <a:xfrm>
-            <a:off x="2687923" y="2564238"/>
-            <a:ext cx="189257" cy="178683"/>
+            <a:off x="1989049" y="2506904"/>
+            <a:ext cx="292182" cy="184839"/>
           </a:xfrm>
           <a:prstGeom prst="rect">
             <a:avLst/>
@@ -5846,8 +5718,8 @@
         </p:nvSpPr>
         <p:spPr>
           <a:xfrm>
-            <a:off x="2656370" y="3386050"/>
-            <a:ext cx="189257" cy="178683"/>
+            <a:off x="2046783" y="3320393"/>
+            <a:ext cx="189257" cy="181712"/>
           </a:xfrm>
           <a:prstGeom prst="rect">
             <a:avLst/>
@@ -5885,8 +5757,789 @@
         </p:nvSpPr>
         <p:spPr>
           <a:xfrm>
-            <a:off x="6667770" y="3210194"/>
-            <a:ext cx="189257" cy="178683"/>
+            <a:off x="6058183" y="3144537"/>
+            <a:ext cx="189257" cy="181712"/>
+          </a:xfrm>
+          <a:prstGeom prst="rect">
+            <a:avLst/>
+          </a:prstGeom>
+          <a:noFill/>
+        </p:spPr>
+        <p:txBody>
+          <a:bodyPr wrap="square" lIns="0" tIns="0" rIns="0" bIns="0" rtlCol="0">
+            <a:noAutofit/>
+          </a:bodyPr>
+          <a:lstStyle/>
+          <a:p>
+            <a:pPr algn="ctr"/>
+            <a:r>
+              <a:rPr lang="en-US" sz="1100" dirty="0" smtClean="0">
+                <a:solidFill>
+                  <a:srgbClr val="7030A0"/>
+                </a:solidFill>
+              </a:rPr>
+              <a:t>1</a:t>
+            </a:r>
+            <a:endParaRPr lang="en-SG" sz="1100" dirty="0">
+              <a:solidFill>
+                <a:srgbClr val="7030A0"/>
+              </a:solidFill>
+            </a:endParaRPr>
+          </a:p>
+        </p:txBody>
+      </p:sp>
+      <p:sp>
+        <p:nvSpPr>
+          <p:cNvPr id="55" name="Rectangle 8"/>
+          <p:cNvSpPr/>
+          <p:nvPr/>
+        </p:nvSpPr>
+        <p:spPr>
+          <a:xfrm>
+            <a:off x="8057552" y="2828841"/>
+            <a:ext cx="708186" cy="290627"/>
+          </a:xfrm>
+          <a:prstGeom prst="rect">
+            <a:avLst/>
+          </a:prstGeom>
+          <a:ln w="19050">
+            <a:solidFill>
+              <a:srgbClr val="7030A0"/>
+            </a:solidFill>
+          </a:ln>
+          <a:effectLst/>
+        </p:spPr>
+        <p:style>
+          <a:lnRef idx="1">
+            <a:schemeClr val="accent4"/>
+          </a:lnRef>
+          <a:fillRef idx="2">
+            <a:schemeClr val="accent4"/>
+          </a:fillRef>
+          <a:effectRef idx="1">
+            <a:schemeClr val="accent4"/>
+          </a:effectRef>
+          <a:fontRef idx="minor">
+            <a:schemeClr val="dk1"/>
+          </a:fontRef>
+        </p:style>
+        <p:txBody>
+          <a:bodyPr rtlCol="0" anchor="ctr"/>
+          <a:lstStyle/>
+          <a:p>
+            <a:pPr algn="ctr"/>
+            <a:r>
+              <a:rPr lang="en-US" sz="1050" dirty="0" smtClean="0">
+                <a:solidFill>
+                  <a:srgbClr val="7030A0"/>
+                </a:solidFill>
+              </a:rPr>
+              <a:t>Phone</a:t>
+            </a:r>
+            <a:endParaRPr lang="en-SG" sz="1050" dirty="0">
+              <a:solidFill>
+                <a:srgbClr val="7030A0"/>
+              </a:solidFill>
+            </a:endParaRPr>
+          </a:p>
+        </p:txBody>
+      </p:sp>
+      <p:sp>
+        <p:nvSpPr>
+          <p:cNvPr id="73" name="Rectangle 8"/>
+          <p:cNvSpPr/>
+          <p:nvPr/>
+        </p:nvSpPr>
+        <p:spPr>
+          <a:xfrm>
+            <a:off x="8057552" y="3162920"/>
+            <a:ext cx="708186" cy="290627"/>
+          </a:xfrm>
+          <a:prstGeom prst="rect">
+            <a:avLst/>
+          </a:prstGeom>
+          <a:ln w="19050">
+            <a:solidFill>
+              <a:srgbClr val="7030A0"/>
+            </a:solidFill>
+          </a:ln>
+          <a:effectLst/>
+        </p:spPr>
+        <p:style>
+          <a:lnRef idx="1">
+            <a:schemeClr val="accent4"/>
+          </a:lnRef>
+          <a:fillRef idx="2">
+            <a:schemeClr val="accent4"/>
+          </a:fillRef>
+          <a:effectRef idx="1">
+            <a:schemeClr val="accent4"/>
+          </a:effectRef>
+          <a:fontRef idx="minor">
+            <a:schemeClr val="dk1"/>
+          </a:fontRef>
+        </p:style>
+        <p:txBody>
+          <a:bodyPr rtlCol="0" anchor="ctr"/>
+          <a:lstStyle/>
+          <a:p>
+            <a:pPr algn="ctr"/>
+            <a:r>
+              <a:rPr lang="en-US" sz="1050" dirty="0" smtClean="0">
+                <a:solidFill>
+                  <a:srgbClr val="7030A0"/>
+                </a:solidFill>
+              </a:rPr>
+              <a:t>Email</a:t>
+            </a:r>
+            <a:endParaRPr lang="en-SG" sz="1050" dirty="0">
+              <a:solidFill>
+                <a:srgbClr val="7030A0"/>
+              </a:solidFill>
+            </a:endParaRPr>
+          </a:p>
+        </p:txBody>
+      </p:sp>
+      <p:sp>
+        <p:nvSpPr>
+          <p:cNvPr id="74" name="Rectangle 8"/>
+          <p:cNvSpPr/>
+          <p:nvPr/>
+        </p:nvSpPr>
+        <p:spPr>
+          <a:xfrm>
+            <a:off x="7056001" y="3787521"/>
+            <a:ext cx="764463" cy="290627"/>
+          </a:xfrm>
+          <a:prstGeom prst="rect">
+            <a:avLst/>
+          </a:prstGeom>
+          <a:ln w="19050">
+            <a:solidFill>
+              <a:srgbClr val="7030A0"/>
+            </a:solidFill>
+          </a:ln>
+          <a:effectLst/>
+        </p:spPr>
+        <p:style>
+          <a:lnRef idx="1">
+            <a:schemeClr val="accent4"/>
+          </a:lnRef>
+          <a:fillRef idx="2">
+            <a:schemeClr val="accent4"/>
+          </a:fillRef>
+          <a:effectRef idx="1">
+            <a:schemeClr val="accent4"/>
+          </a:effectRef>
+          <a:fontRef idx="minor">
+            <a:schemeClr val="dk1"/>
+          </a:fontRef>
+        </p:style>
+        <p:txBody>
+          <a:bodyPr rtlCol="0" anchor="ctr"/>
+          <a:lstStyle/>
+          <a:p>
+            <a:pPr algn="ctr"/>
+            <a:r>
+              <a:rPr lang="en-US" sz="1050" dirty="0" smtClean="0">
+                <a:solidFill>
+                  <a:srgbClr val="7030A0"/>
+                </a:solidFill>
+              </a:rPr>
+              <a:t>Birthday</a:t>
+            </a:r>
+            <a:endParaRPr lang="en-SG" sz="1050" dirty="0">
+              <a:solidFill>
+                <a:srgbClr val="7030A0"/>
+              </a:solidFill>
+            </a:endParaRPr>
+          </a:p>
+        </p:txBody>
+      </p:sp>
+      <p:cxnSp>
+        <p:nvCxnSpPr>
+          <p:cNvPr id="88" name="Elbow Connector 87"/>
+          <p:cNvCxnSpPr/>
+          <p:nvPr/>
+        </p:nvCxnSpPr>
+        <p:spPr>
+          <a:xfrm>
+            <a:off x="7812552" y="2993207"/>
+            <a:ext cx="259200" cy="202"/>
+          </a:xfrm>
+          <a:prstGeom prst="straightConnector1">
+            <a:avLst/>
+          </a:prstGeom>
+          <a:ln w="19050">
+            <a:solidFill>
+              <a:srgbClr val="7030A0"/>
+            </a:solidFill>
+            <a:headEnd type="none" w="med" len="med"/>
+            <a:tailEnd type="arrow" w="med" len="med"/>
+          </a:ln>
+          <a:effectLst/>
+        </p:spPr>
+        <p:style>
+          <a:lnRef idx="1">
+            <a:schemeClr val="accent2"/>
+          </a:lnRef>
+          <a:fillRef idx="2">
+            <a:schemeClr val="accent2"/>
+          </a:fillRef>
+          <a:effectRef idx="1">
+            <a:schemeClr val="accent2"/>
+          </a:effectRef>
+          <a:fontRef idx="minor">
+            <a:schemeClr val="dk1"/>
+          </a:fontRef>
+        </p:style>
+      </p:cxnSp>
+      <p:cxnSp>
+        <p:nvCxnSpPr>
+          <p:cNvPr id="89" name="Elbow Connector 88"/>
+          <p:cNvCxnSpPr/>
+          <p:nvPr/>
+        </p:nvCxnSpPr>
+        <p:spPr>
+          <a:xfrm>
+            <a:off x="7812552" y="3316185"/>
+            <a:ext cx="259200" cy="109"/>
+          </a:xfrm>
+          <a:prstGeom prst="straightConnector1">
+            <a:avLst/>
+          </a:prstGeom>
+          <a:ln w="19050">
+            <a:solidFill>
+              <a:srgbClr val="7030A0"/>
+            </a:solidFill>
+            <a:headEnd type="none" w="med" len="med"/>
+            <a:tailEnd type="arrow" w="med" len="med"/>
+          </a:ln>
+          <a:effectLst/>
+        </p:spPr>
+        <p:style>
+          <a:lnRef idx="1">
+            <a:schemeClr val="accent2"/>
+          </a:lnRef>
+          <a:fillRef idx="2">
+            <a:schemeClr val="accent2"/>
+          </a:fillRef>
+          <a:effectRef idx="1">
+            <a:schemeClr val="accent2"/>
+          </a:effectRef>
+          <a:fontRef idx="minor">
+            <a:schemeClr val="dk1"/>
+          </a:fontRef>
+        </p:style>
+      </p:cxnSp>
+      <p:sp>
+        <p:nvSpPr>
+          <p:cNvPr id="91" name="Rectangle 8"/>
+          <p:cNvSpPr/>
+          <p:nvPr/>
+        </p:nvSpPr>
+        <p:spPr>
+          <a:xfrm>
+            <a:off x="7054637" y="4110498"/>
+            <a:ext cx="764463" cy="290627"/>
+          </a:xfrm>
+          <a:prstGeom prst="rect">
+            <a:avLst/>
+          </a:prstGeom>
+          <a:ln w="19050">
+            <a:solidFill>
+              <a:srgbClr val="7030A0"/>
+            </a:solidFill>
+          </a:ln>
+          <a:effectLst/>
+        </p:spPr>
+        <p:style>
+          <a:lnRef idx="1">
+            <a:schemeClr val="accent4"/>
+          </a:lnRef>
+          <a:fillRef idx="2">
+            <a:schemeClr val="accent4"/>
+          </a:fillRef>
+          <a:effectRef idx="1">
+            <a:schemeClr val="accent4"/>
+          </a:effectRef>
+          <a:fontRef idx="minor">
+            <a:schemeClr val="dk1"/>
+          </a:fontRef>
+        </p:style>
+        <p:txBody>
+          <a:bodyPr rtlCol="0" anchor="ctr"/>
+          <a:lstStyle/>
+          <a:p>
+            <a:pPr algn="ctr"/>
+            <a:r>
+              <a:rPr lang="en-US" sz="1050" dirty="0" smtClean="0">
+                <a:solidFill>
+                  <a:srgbClr val="7030A0"/>
+                </a:solidFill>
+              </a:rPr>
+              <a:t>Photo</a:t>
+            </a:r>
+          </a:p>
+        </p:txBody>
+      </p:sp>
+      <p:cxnSp>
+        <p:nvCxnSpPr>
+          <p:cNvPr id="26" name="Straight Connector 25"/>
+          <p:cNvCxnSpPr>
+            <a:stCxn id="9" idx="1"/>
+          </p:cNvCxnSpPr>
+          <p:nvPr/>
+        </p:nvCxnSpPr>
+        <p:spPr>
+          <a:xfrm flipH="1">
+            <a:off x="1608030" y="3499409"/>
+            <a:ext cx="0" cy="432000"/>
+          </a:xfrm>
+          <a:prstGeom prst="line">
+            <a:avLst/>
+          </a:prstGeom>
+          <a:ln w="19050">
+            <a:solidFill>
+              <a:srgbClr val="7030A0"/>
+            </a:solidFill>
+          </a:ln>
+        </p:spPr>
+        <p:style>
+          <a:lnRef idx="1">
+            <a:schemeClr val="accent1"/>
+          </a:lnRef>
+          <a:fillRef idx="0">
+            <a:schemeClr val="accent1"/>
+          </a:fillRef>
+          <a:effectRef idx="0">
+            <a:schemeClr val="accent1"/>
+          </a:effectRef>
+          <a:fontRef idx="minor">
+            <a:schemeClr val="tx1"/>
+          </a:fontRef>
+        </p:style>
+      </p:cxnSp>
+      <p:cxnSp>
+        <p:nvCxnSpPr>
+          <p:cNvPr id="28" name="Straight Connector 27"/>
+          <p:cNvCxnSpPr/>
+          <p:nvPr/>
+        </p:nvCxnSpPr>
+        <p:spPr>
+          <a:xfrm>
+            <a:off x="1595027" y="3931409"/>
+            <a:ext cx="4644000" cy="0"/>
+          </a:xfrm>
+          <a:prstGeom prst="line">
+            <a:avLst/>
+          </a:prstGeom>
+          <a:ln w="19050">
+            <a:solidFill>
+              <a:srgbClr val="7030A0"/>
+            </a:solidFill>
+          </a:ln>
+        </p:spPr>
+        <p:style>
+          <a:lnRef idx="1">
+            <a:schemeClr val="accent1"/>
+          </a:lnRef>
+          <a:fillRef idx="0">
+            <a:schemeClr val="accent1"/>
+          </a:fillRef>
+          <a:effectRef idx="0">
+            <a:schemeClr val="accent1"/>
+          </a:effectRef>
+          <a:fontRef idx="minor">
+            <a:schemeClr val="tx1"/>
+          </a:fontRef>
+        </p:style>
+      </p:cxnSp>
+      <p:cxnSp>
+        <p:nvCxnSpPr>
+          <p:cNvPr id="90" name="Elbow Connector 88"/>
+          <p:cNvCxnSpPr/>
+          <p:nvPr/>
+        </p:nvCxnSpPr>
+        <p:spPr>
+          <a:xfrm flipV="1">
+            <a:off x="6235193" y="3142281"/>
+            <a:ext cx="10808" cy="792000"/>
+          </a:xfrm>
+          <a:prstGeom prst="straightConnector1">
+            <a:avLst/>
+          </a:prstGeom>
+          <a:ln w="19050">
+            <a:solidFill>
+              <a:srgbClr val="7030A0"/>
+            </a:solidFill>
+            <a:headEnd type="none" w="med" len="med"/>
+            <a:tailEnd type="arrow" w="med" len="med"/>
+          </a:ln>
+          <a:effectLst/>
+        </p:spPr>
+        <p:style>
+          <a:lnRef idx="1">
+            <a:schemeClr val="accent2"/>
+          </a:lnRef>
+          <a:fillRef idx="2">
+            <a:schemeClr val="accent2"/>
+          </a:fillRef>
+          <a:effectRef idx="1">
+            <a:schemeClr val="accent2"/>
+          </a:effectRef>
+          <a:fontRef idx="minor">
+            <a:schemeClr val="dk1"/>
+          </a:fontRef>
+        </p:style>
+      </p:cxnSp>
+      <p:cxnSp>
+        <p:nvCxnSpPr>
+          <p:cNvPr id="77" name="Straight Connector 76"/>
+          <p:cNvCxnSpPr/>
+          <p:nvPr/>
+        </p:nvCxnSpPr>
+        <p:spPr>
+          <a:xfrm>
+            <a:off x="6858000" y="2624526"/>
+            <a:ext cx="0" cy="1631285"/>
+          </a:xfrm>
+          <a:prstGeom prst="line">
+            <a:avLst/>
+          </a:prstGeom>
+          <a:ln w="19050">
+            <a:solidFill>
+              <a:srgbClr val="7030A0"/>
+            </a:solidFill>
+          </a:ln>
+        </p:spPr>
+        <p:style>
+          <a:lnRef idx="1">
+            <a:schemeClr val="accent1"/>
+          </a:lnRef>
+          <a:fillRef idx="0">
+            <a:schemeClr val="accent1"/>
+          </a:fillRef>
+          <a:effectRef idx="0">
+            <a:schemeClr val="accent1"/>
+          </a:effectRef>
+          <a:fontRef idx="minor">
+            <a:schemeClr val="tx1"/>
+          </a:fontRef>
+        </p:style>
+      </p:cxnSp>
+      <p:cxnSp>
+        <p:nvCxnSpPr>
+          <p:cNvPr id="82" name="Straight Connector 81"/>
+          <p:cNvCxnSpPr/>
+          <p:nvPr/>
+        </p:nvCxnSpPr>
+        <p:spPr>
+          <a:xfrm>
+            <a:off x="6660000" y="2973600"/>
+            <a:ext cx="194400" cy="0"/>
+          </a:xfrm>
+          <a:prstGeom prst="line">
+            <a:avLst/>
+          </a:prstGeom>
+          <a:ln w="19050">
+            <a:solidFill>
+              <a:srgbClr val="7030A0"/>
+            </a:solidFill>
+          </a:ln>
+        </p:spPr>
+        <p:style>
+          <a:lnRef idx="1">
+            <a:schemeClr val="accent1"/>
+          </a:lnRef>
+          <a:fillRef idx="0">
+            <a:schemeClr val="accent1"/>
+          </a:fillRef>
+          <a:effectRef idx="0">
+            <a:schemeClr val="accent1"/>
+          </a:effectRef>
+          <a:fontRef idx="minor">
+            <a:schemeClr val="tx1"/>
+          </a:fontRef>
+        </p:style>
+      </p:cxnSp>
+      <p:cxnSp>
+        <p:nvCxnSpPr>
+          <p:cNvPr id="87" name="Elbow Connector 88"/>
+          <p:cNvCxnSpPr/>
+          <p:nvPr/>
+        </p:nvCxnSpPr>
+        <p:spPr>
+          <a:xfrm>
+            <a:off x="6847201" y="2623669"/>
+            <a:ext cx="223200" cy="109"/>
+          </a:xfrm>
+          <a:prstGeom prst="straightConnector1">
+            <a:avLst/>
+          </a:prstGeom>
+          <a:ln w="19050">
+            <a:solidFill>
+              <a:srgbClr val="7030A0"/>
+            </a:solidFill>
+            <a:headEnd type="none" w="med" len="med"/>
+            <a:tailEnd type="arrow" w="med" len="med"/>
+          </a:ln>
+          <a:effectLst/>
+        </p:spPr>
+        <p:style>
+          <a:lnRef idx="1">
+            <a:schemeClr val="accent2"/>
+          </a:lnRef>
+          <a:fillRef idx="2">
+            <a:schemeClr val="accent2"/>
+          </a:fillRef>
+          <a:effectRef idx="1">
+            <a:schemeClr val="accent2"/>
+          </a:effectRef>
+          <a:fontRef idx="minor">
+            <a:schemeClr val="dk1"/>
+          </a:fontRef>
+        </p:style>
+      </p:cxnSp>
+      <p:cxnSp>
+        <p:nvCxnSpPr>
+          <p:cNvPr id="92" name="Elbow Connector 88"/>
+          <p:cNvCxnSpPr/>
+          <p:nvPr/>
+        </p:nvCxnSpPr>
+        <p:spPr>
+          <a:xfrm>
+            <a:off x="6868394" y="2973600"/>
+            <a:ext cx="201600" cy="109"/>
+          </a:xfrm>
+          <a:prstGeom prst="straightConnector1">
+            <a:avLst/>
+          </a:prstGeom>
+          <a:ln w="19050">
+            <a:solidFill>
+              <a:srgbClr val="7030A0"/>
+            </a:solidFill>
+            <a:headEnd type="none" w="med" len="med"/>
+            <a:tailEnd type="arrow" w="med" len="med"/>
+          </a:ln>
+          <a:effectLst/>
+        </p:spPr>
+        <p:style>
+          <a:lnRef idx="1">
+            <a:schemeClr val="accent2"/>
+          </a:lnRef>
+          <a:fillRef idx="2">
+            <a:schemeClr val="accent2"/>
+          </a:fillRef>
+          <a:effectRef idx="1">
+            <a:schemeClr val="accent2"/>
+          </a:effectRef>
+          <a:fontRef idx="minor">
+            <a:schemeClr val="dk1"/>
+          </a:fontRef>
+        </p:style>
+      </p:cxnSp>
+      <p:cxnSp>
+        <p:nvCxnSpPr>
+          <p:cNvPr id="93" name="Elbow Connector 88"/>
+          <p:cNvCxnSpPr/>
+          <p:nvPr/>
+        </p:nvCxnSpPr>
+        <p:spPr>
+          <a:xfrm>
+            <a:off x="6844719" y="4254331"/>
+            <a:ext cx="223200" cy="109"/>
+          </a:xfrm>
+          <a:prstGeom prst="straightConnector1">
+            <a:avLst/>
+          </a:prstGeom>
+          <a:ln w="19050">
+            <a:solidFill>
+              <a:srgbClr val="7030A0"/>
+            </a:solidFill>
+            <a:headEnd type="none" w="med" len="med"/>
+            <a:tailEnd type="arrow" w="med" len="med"/>
+          </a:ln>
+          <a:effectLst/>
+        </p:spPr>
+        <p:style>
+          <a:lnRef idx="1">
+            <a:schemeClr val="accent2"/>
+          </a:lnRef>
+          <a:fillRef idx="2">
+            <a:schemeClr val="accent2"/>
+          </a:fillRef>
+          <a:effectRef idx="1">
+            <a:schemeClr val="accent2"/>
+          </a:effectRef>
+          <a:fontRef idx="minor">
+            <a:schemeClr val="dk1"/>
+          </a:fontRef>
+        </p:style>
+      </p:cxnSp>
+      <p:cxnSp>
+        <p:nvCxnSpPr>
+          <p:cNvPr id="94" name="Elbow Connector 88"/>
+          <p:cNvCxnSpPr/>
+          <p:nvPr/>
+        </p:nvCxnSpPr>
+        <p:spPr>
+          <a:xfrm>
+            <a:off x="6866319" y="3283301"/>
+            <a:ext cx="201600" cy="109"/>
+          </a:xfrm>
+          <a:prstGeom prst="straightConnector1">
+            <a:avLst/>
+          </a:prstGeom>
+          <a:ln w="19050">
+            <a:solidFill>
+              <a:srgbClr val="7030A0"/>
+            </a:solidFill>
+            <a:headEnd type="none" w="med" len="med"/>
+            <a:tailEnd type="arrow" w="med" len="med"/>
+          </a:ln>
+          <a:effectLst/>
+        </p:spPr>
+        <p:style>
+          <a:lnRef idx="1">
+            <a:schemeClr val="accent2"/>
+          </a:lnRef>
+          <a:fillRef idx="2">
+            <a:schemeClr val="accent2"/>
+          </a:fillRef>
+          <a:effectRef idx="1">
+            <a:schemeClr val="accent2"/>
+          </a:effectRef>
+          <a:fontRef idx="minor">
+            <a:schemeClr val="dk1"/>
+          </a:fontRef>
+        </p:style>
+      </p:cxnSp>
+      <p:cxnSp>
+        <p:nvCxnSpPr>
+          <p:cNvPr id="95" name="Elbow Connector 88"/>
+          <p:cNvCxnSpPr/>
+          <p:nvPr/>
+        </p:nvCxnSpPr>
+        <p:spPr>
+          <a:xfrm>
+            <a:off x="6853963" y="3606170"/>
+            <a:ext cx="201600" cy="109"/>
+          </a:xfrm>
+          <a:prstGeom prst="straightConnector1">
+            <a:avLst/>
+          </a:prstGeom>
+          <a:ln w="19050">
+            <a:solidFill>
+              <a:srgbClr val="7030A0"/>
+            </a:solidFill>
+            <a:headEnd type="none" w="med" len="med"/>
+            <a:tailEnd type="arrow" w="med" len="med"/>
+          </a:ln>
+          <a:effectLst/>
+        </p:spPr>
+        <p:style>
+          <a:lnRef idx="1">
+            <a:schemeClr val="accent2"/>
+          </a:lnRef>
+          <a:fillRef idx="2">
+            <a:schemeClr val="accent2"/>
+          </a:fillRef>
+          <a:effectRef idx="1">
+            <a:schemeClr val="accent2"/>
+          </a:effectRef>
+          <a:fontRef idx="minor">
+            <a:schemeClr val="dk1"/>
+          </a:fontRef>
+        </p:style>
+      </p:cxnSp>
+      <p:cxnSp>
+        <p:nvCxnSpPr>
+          <p:cNvPr id="96" name="Elbow Connector 88"/>
+          <p:cNvCxnSpPr/>
+          <p:nvPr/>
+        </p:nvCxnSpPr>
+        <p:spPr>
+          <a:xfrm>
+            <a:off x="6868394" y="3942824"/>
+            <a:ext cx="201600" cy="109"/>
+          </a:xfrm>
+          <a:prstGeom prst="straightConnector1">
+            <a:avLst/>
+          </a:prstGeom>
+          <a:ln w="19050">
+            <a:solidFill>
+              <a:srgbClr val="7030A0"/>
+            </a:solidFill>
+            <a:headEnd type="none" w="med" len="med"/>
+            <a:tailEnd type="arrow" w="med" len="med"/>
+          </a:ln>
+          <a:effectLst/>
+        </p:spPr>
+        <p:style>
+          <a:lnRef idx="1">
+            <a:schemeClr val="accent2"/>
+          </a:lnRef>
+          <a:fillRef idx="2">
+            <a:schemeClr val="accent2"/>
+          </a:fillRef>
+          <a:effectRef idx="1">
+            <a:schemeClr val="accent2"/>
+          </a:effectRef>
+          <a:fontRef idx="minor">
+            <a:schemeClr val="dk1"/>
+          </a:fontRef>
+        </p:style>
+      </p:cxnSp>
+      <p:sp>
+        <p:nvSpPr>
+          <p:cNvPr id="79" name="TextBox 78"/>
+          <p:cNvSpPr txBox="1"/>
+          <p:nvPr/>
+        </p:nvSpPr>
+        <p:spPr>
+          <a:xfrm>
+            <a:off x="6822700" y="2811495"/>
+            <a:ext cx="189257" cy="181712"/>
+          </a:xfrm>
+          <a:prstGeom prst="rect">
+            <a:avLst/>
+          </a:prstGeom>
+          <a:noFill/>
+        </p:spPr>
+        <p:txBody>
+          <a:bodyPr wrap="square" lIns="0" tIns="0" rIns="0" bIns="0" rtlCol="0">
+            <a:noAutofit/>
+          </a:bodyPr>
+          <a:lstStyle/>
+          <a:p>
+            <a:pPr algn="ctr"/>
+            <a:r>
+              <a:rPr lang="en-US" sz="1100" dirty="0" smtClean="0">
+                <a:solidFill>
+                  <a:srgbClr val="7030A0"/>
+                </a:solidFill>
+              </a:rPr>
+              <a:t>1</a:t>
+            </a:r>
+            <a:endParaRPr lang="en-SG" sz="1100" dirty="0">
+              <a:solidFill>
+                <a:srgbClr val="7030A0"/>
+              </a:solidFill>
+            </a:endParaRPr>
+          </a:p>
+        </p:txBody>
+      </p:sp>
+      <p:sp>
+        <p:nvSpPr>
+          <p:cNvPr id="81" name="TextBox 80"/>
+          <p:cNvSpPr txBox="1"/>
+          <p:nvPr/>
+        </p:nvSpPr>
+        <p:spPr>
+          <a:xfrm>
+            <a:off x="6893301" y="3109983"/>
+            <a:ext cx="48506" cy="171330"/>
           </a:xfrm>
           <a:prstGeom prst="rect">
             <a:avLst/>

</xml_diff>

<commit_message>
Update model diagram (#127)
</commit_message>
<xml_diff>
--- a/docs/diagrams/ModelComponentClassDiagram.pptx
+++ b/docs/diagrams/ModelComponentClassDiagram.pptx
@@ -208,7 +208,7 @@
           <a:p>
             <a:fld id="{F5CC4B3F-88C1-4FFA-B1B6-F41C21DC6924}" type="datetimeFigureOut">
               <a:rPr lang="en-US" smtClean="0"/>
-              <a:t>10/27/17</a:t>
+              <a:t>11/2/17</a:t>
             </a:fld>
             <a:endParaRPr lang="en-US"/>
           </a:p>
@@ -741,7 +741,7 @@
           <a:p>
             <a:fld id="{78C97017-6FC3-485B-9764-EAC9E56C1D49}" type="datetimeFigureOut">
               <a:rPr lang="en-US" smtClean="0"/>
-              <a:t>10/27/17</a:t>
+              <a:t>11/2/17</a:t>
             </a:fld>
             <a:endParaRPr lang="en-US"/>
           </a:p>
@@ -911,7 +911,7 @@
           <a:p>
             <a:fld id="{78C97017-6FC3-485B-9764-EAC9E56C1D49}" type="datetimeFigureOut">
               <a:rPr lang="en-US" smtClean="0"/>
-              <a:t>10/27/17</a:t>
+              <a:t>11/2/17</a:t>
             </a:fld>
             <a:endParaRPr lang="en-US"/>
           </a:p>
@@ -1091,7 +1091,7 @@
           <a:p>
             <a:fld id="{78C97017-6FC3-485B-9764-EAC9E56C1D49}" type="datetimeFigureOut">
               <a:rPr lang="en-US" smtClean="0"/>
-              <a:t>10/27/17</a:t>
+              <a:t>11/2/17</a:t>
             </a:fld>
             <a:endParaRPr lang="en-US"/>
           </a:p>
@@ -1261,7 +1261,7 @@
           <a:p>
             <a:fld id="{78C97017-6FC3-485B-9764-EAC9E56C1D49}" type="datetimeFigureOut">
               <a:rPr lang="en-US" smtClean="0"/>
-              <a:t>10/27/17</a:t>
+              <a:t>11/2/17</a:t>
             </a:fld>
             <a:endParaRPr lang="en-US"/>
           </a:p>
@@ -1507,7 +1507,7 @@
           <a:p>
             <a:fld id="{78C97017-6FC3-485B-9764-EAC9E56C1D49}" type="datetimeFigureOut">
               <a:rPr lang="en-US" smtClean="0"/>
-              <a:t>10/27/17</a:t>
+              <a:t>11/2/17</a:t>
             </a:fld>
             <a:endParaRPr lang="en-US"/>
           </a:p>
@@ -1795,7 +1795,7 @@
           <a:p>
             <a:fld id="{78C97017-6FC3-485B-9764-EAC9E56C1D49}" type="datetimeFigureOut">
               <a:rPr lang="en-US" smtClean="0"/>
-              <a:t>10/27/17</a:t>
+              <a:t>11/2/17</a:t>
             </a:fld>
             <a:endParaRPr lang="en-US"/>
           </a:p>
@@ -2217,7 +2217,7 @@
           <a:p>
             <a:fld id="{78C97017-6FC3-485B-9764-EAC9E56C1D49}" type="datetimeFigureOut">
               <a:rPr lang="en-US" smtClean="0"/>
-              <a:t>10/27/17</a:t>
+              <a:t>11/2/17</a:t>
             </a:fld>
             <a:endParaRPr lang="en-US"/>
           </a:p>
@@ -2335,7 +2335,7 @@
           <a:p>
             <a:fld id="{78C97017-6FC3-485B-9764-EAC9E56C1D49}" type="datetimeFigureOut">
               <a:rPr lang="en-US" smtClean="0"/>
-              <a:t>10/27/17</a:t>
+              <a:t>11/2/17</a:t>
             </a:fld>
             <a:endParaRPr lang="en-US"/>
           </a:p>
@@ -2430,7 +2430,7 @@
           <a:p>
             <a:fld id="{78C97017-6FC3-485B-9764-EAC9E56C1D49}" type="datetimeFigureOut">
               <a:rPr lang="en-US" smtClean="0"/>
-              <a:t>10/27/17</a:t>
+              <a:t>11/2/17</a:t>
             </a:fld>
             <a:endParaRPr lang="en-US"/>
           </a:p>
@@ -2707,7 +2707,7 @@
           <a:p>
             <a:fld id="{78C97017-6FC3-485B-9764-EAC9E56C1D49}" type="datetimeFigureOut">
               <a:rPr lang="en-US" smtClean="0"/>
-              <a:t>10/27/17</a:t>
+              <a:t>11/2/17</a:t>
             </a:fld>
             <a:endParaRPr lang="en-US"/>
           </a:p>
@@ -2960,7 +2960,7 @@
           <a:p>
             <a:fld id="{78C97017-6FC3-485B-9764-EAC9E56C1D49}" type="datetimeFigureOut">
               <a:rPr lang="en-US" smtClean="0"/>
-              <a:t>10/27/17</a:t>
+              <a:t>11/2/17</a:t>
             </a:fld>
             <a:endParaRPr lang="en-US"/>
           </a:p>
@@ -3173,7 +3173,7 @@
           <a:p>
             <a:fld id="{78C97017-6FC3-485B-9764-EAC9E56C1D49}" type="datetimeFigureOut">
               <a:rPr lang="en-US" smtClean="0"/>
-              <a:t>10/27/17</a:t>
+              <a:t>11/2/17</a:t>
             </a:fld>
             <a:endParaRPr lang="en-US"/>
           </a:p>
@@ -3556,8 +3556,8 @@
         </p:nvSpPr>
         <p:spPr>
           <a:xfrm>
-            <a:off x="228600" y="1547164"/>
-            <a:ext cx="8649969" cy="3120125"/>
+            <a:off x="376927" y="692551"/>
+            <a:ext cx="8649969" cy="4419600"/>
           </a:xfrm>
           <a:prstGeom prst="roundRect">
             <a:avLst>
@@ -3593,15 +3593,8 @@
           <a:bodyPr rtlCol="0" anchor="t"/>
           <a:lstStyle/>
           <a:p>
-            <a:r>
-              <a:rPr lang="en-US" sz="1200" b="1" dirty="0" smtClean="0">
-                <a:solidFill>
-                  <a:srgbClr val="7030A0"/>
-                </a:solidFill>
-              </a:rPr>
-              <a:t>Model</a:t>
-            </a:r>
-            <a:endParaRPr lang="en-SG" sz="1200" b="1" dirty="0">
+            <a:pPr algn="ctr"/>
+            <a:endParaRPr lang="en-SG" sz="1200" dirty="0">
               <a:solidFill>
                 <a:srgbClr val="7030A0"/>
               </a:solidFill>
@@ -4359,12 +4352,12 @@
         </p:nvCxnSpPr>
         <p:spPr>
           <a:xfrm>
-            <a:off x="3319392" y="2747855"/>
+            <a:off x="3330644" y="2741842"/>
             <a:ext cx="540000" cy="210852"/>
           </a:xfrm>
           <a:prstGeom prst="bentConnector3">
             <a:avLst>
-              <a:gd name="adj1" fmla="val 47935"/>
+              <a:gd name="adj1" fmla="val 46877"/>
             </a:avLst>
           </a:prstGeom>
           <a:ln w="19050">
@@ -4400,7 +4393,7 @@
         <p:spPr>
           <a:xfrm>
             <a:off x="3786875" y="2207131"/>
-            <a:ext cx="1156969" cy="352637"/>
+            <a:ext cx="1229413" cy="352637"/>
           </a:xfrm>
           <a:prstGeom prst="rect">
             <a:avLst/>
@@ -4432,12 +4425,12 @@
           <a:p>
             <a:pPr algn="ctr"/>
             <a:r>
-              <a:rPr lang="en-US" sz="1050" dirty="0" err="1" smtClean="0">
+              <a:rPr lang="en-US" sz="1050" smtClean="0">
                 <a:solidFill>
                   <a:srgbClr val="7030A0"/>
                 </a:solidFill>
               </a:rPr>
-              <a:t>UniqueModList</a:t>
+              <a:t>UniqueModuleList</a:t>
             </a:r>
             <a:endParaRPr lang="en-SG" sz="1050" dirty="0">
               <a:solidFill>
@@ -4638,7 +4631,7 @@
         <p:spPr>
           <a:xfrm>
             <a:off x="4701912" y="1735894"/>
-            <a:ext cx="483700" cy="352637"/>
+            <a:ext cx="632088" cy="352637"/>
           </a:xfrm>
           <a:prstGeom prst="rect">
             <a:avLst/>
@@ -4670,12 +4663,12 @@
           <a:p>
             <a:pPr algn="ctr"/>
             <a:r>
-              <a:rPr lang="en-US" sz="1050" dirty="0" smtClean="0">
+              <a:rPr lang="en-US" sz="1050" smtClean="0">
                 <a:solidFill>
                   <a:srgbClr val="7030A0"/>
                 </a:solidFill>
               </a:rPr>
-              <a:t>Mod</a:t>
+              <a:t>Module</a:t>
             </a:r>
             <a:endParaRPr lang="en-SG" sz="1050" dirty="0">
               <a:solidFill>
@@ -5116,19 +5109,17 @@
       <p:cxnSp>
         <p:nvCxnSpPr>
           <p:cNvPr id="97" name="Elbow Connector 63"/>
-          <p:cNvCxnSpPr>
-            <a:stCxn id="99" idx="3"/>
-          </p:cNvCxnSpPr>
+          <p:cNvCxnSpPr/>
           <p:nvPr/>
         </p:nvCxnSpPr>
         <p:spPr>
           <a:xfrm rot="16200000" flipH="1">
-            <a:off x="2671672" y="2414168"/>
+            <a:off x="2652911" y="2423654"/>
             <a:ext cx="298972" cy="22605"/>
           </a:xfrm>
           <a:prstGeom prst="bentConnector3">
             <a:avLst>
-              <a:gd name="adj1" fmla="val 50000"/>
+              <a:gd name="adj1" fmla="val -2208"/>
             </a:avLst>
           </a:prstGeom>
           <a:ln w="19050">
@@ -5446,8 +5437,8 @@
         </p:nvCxnSpPr>
         <p:spPr>
           <a:xfrm rot="16200000" flipV="1">
-            <a:off x="5300794" y="2026501"/>
-            <a:ext cx="400799" cy="1114697"/>
+            <a:off x="5337016" y="2062723"/>
+            <a:ext cx="400799" cy="1042253"/>
           </a:xfrm>
           <a:prstGeom prst="bentConnector2">
             <a:avLst/>
@@ -5484,7 +5475,7 @@
         </p:nvSpPr>
         <p:spPr>
           <a:xfrm>
-            <a:off x="3602270" y="2141464"/>
+            <a:off x="3565906" y="2181482"/>
             <a:ext cx="189257" cy="181712"/>
           </a:xfrm>
           <a:prstGeom prst="rect">
@@ -6560,6 +6551,751 @@
                 </a:solidFill>
               </a:rPr>
               <a:t>1</a:t>
+            </a:r>
+            <a:endParaRPr lang="en-SG" sz="1100" dirty="0">
+              <a:solidFill>
+                <a:srgbClr val="7030A0"/>
+              </a:solidFill>
+            </a:endParaRPr>
+          </a:p>
+        </p:txBody>
+      </p:sp>
+      <p:cxnSp>
+        <p:nvCxnSpPr>
+          <p:cNvPr id="84" name="Straight Connector 83"/>
+          <p:cNvCxnSpPr/>
+          <p:nvPr/>
+        </p:nvCxnSpPr>
+        <p:spPr>
+          <a:xfrm flipH="1" flipV="1">
+            <a:off x="3584509" y="1223171"/>
+            <a:ext cx="0" cy="1164066"/>
+          </a:xfrm>
+          <a:prstGeom prst="line">
+            <a:avLst/>
+          </a:prstGeom>
+          <a:ln w="19050">
+            <a:solidFill>
+              <a:srgbClr val="7030A0"/>
+            </a:solidFill>
+          </a:ln>
+        </p:spPr>
+        <p:style>
+          <a:lnRef idx="1">
+            <a:schemeClr val="accent1"/>
+          </a:lnRef>
+          <a:fillRef idx="0">
+            <a:schemeClr val="accent1"/>
+          </a:fillRef>
+          <a:effectRef idx="0">
+            <a:schemeClr val="accent1"/>
+          </a:effectRef>
+          <a:fontRef idx="minor">
+            <a:schemeClr val="tx1"/>
+          </a:fontRef>
+        </p:style>
+      </p:cxnSp>
+      <p:cxnSp>
+        <p:nvCxnSpPr>
+          <p:cNvPr id="86" name="Elbow Connector 88"/>
+          <p:cNvCxnSpPr/>
+          <p:nvPr/>
+        </p:nvCxnSpPr>
+        <p:spPr>
+          <a:xfrm>
+            <a:off x="3584509" y="1223171"/>
+            <a:ext cx="223200" cy="109"/>
+          </a:xfrm>
+          <a:prstGeom prst="straightConnector1">
+            <a:avLst/>
+          </a:prstGeom>
+          <a:ln w="19050">
+            <a:solidFill>
+              <a:srgbClr val="7030A0"/>
+            </a:solidFill>
+            <a:headEnd type="none" w="med" len="med"/>
+            <a:tailEnd type="arrow" w="med" len="med"/>
+          </a:ln>
+          <a:effectLst/>
+        </p:spPr>
+        <p:style>
+          <a:lnRef idx="1">
+            <a:schemeClr val="accent2"/>
+          </a:lnRef>
+          <a:fillRef idx="2">
+            <a:schemeClr val="accent2"/>
+          </a:fillRef>
+          <a:effectRef idx="1">
+            <a:schemeClr val="accent2"/>
+          </a:effectRef>
+          <a:fontRef idx="minor">
+            <a:schemeClr val="dk1"/>
+          </a:fontRef>
+        </p:style>
+      </p:cxnSp>
+      <p:sp>
+        <p:nvSpPr>
+          <p:cNvPr id="98" name="Rectangle 8"/>
+          <p:cNvSpPr/>
+          <p:nvPr/>
+        </p:nvSpPr>
+        <p:spPr>
+          <a:xfrm>
+            <a:off x="3789172" y="1038197"/>
+            <a:ext cx="1156969" cy="352637"/>
+          </a:xfrm>
+          <a:prstGeom prst="rect">
+            <a:avLst/>
+          </a:prstGeom>
+          <a:ln w="19050">
+            <a:solidFill>
+              <a:srgbClr val="7030A0"/>
+            </a:solidFill>
+          </a:ln>
+          <a:effectLst/>
+        </p:spPr>
+        <p:style>
+          <a:lnRef idx="1">
+            <a:schemeClr val="accent4"/>
+          </a:lnRef>
+          <a:fillRef idx="2">
+            <a:schemeClr val="accent4"/>
+          </a:fillRef>
+          <a:effectRef idx="1">
+            <a:schemeClr val="accent4"/>
+          </a:effectRef>
+          <a:fontRef idx="minor">
+            <a:schemeClr val="dk1"/>
+          </a:fontRef>
+        </p:style>
+        <p:txBody>
+          <a:bodyPr rtlCol="0" anchor="ctr"/>
+          <a:lstStyle/>
+          <a:p>
+            <a:pPr algn="ctr"/>
+            <a:r>
+              <a:rPr lang="en-US" sz="1050" dirty="0" err="1" smtClean="0">
+                <a:solidFill>
+                  <a:srgbClr val="7030A0"/>
+                </a:solidFill>
+              </a:rPr>
+              <a:t>UniqueTaskList</a:t>
+            </a:r>
+            <a:endParaRPr lang="en-SG" sz="1050" dirty="0">
+              <a:solidFill>
+                <a:srgbClr val="7030A0"/>
+              </a:solidFill>
+            </a:endParaRPr>
+          </a:p>
+        </p:txBody>
+      </p:sp>
+      <p:sp>
+        <p:nvSpPr>
+          <p:cNvPr id="101" name="Flowchart: Decision 96"/>
+          <p:cNvSpPr/>
+          <p:nvPr/>
+        </p:nvSpPr>
+        <p:spPr>
+          <a:xfrm>
+            <a:off x="4952833" y="1128115"/>
+            <a:ext cx="244800" cy="172800"/>
+          </a:xfrm>
+          <a:prstGeom prst="flowChartDecision">
+            <a:avLst/>
+          </a:prstGeom>
+          <a:noFill/>
+          <a:ln w="19050">
+            <a:solidFill>
+              <a:srgbClr val="7030A0"/>
+            </a:solidFill>
+          </a:ln>
+          <a:effectLst/>
+        </p:spPr>
+        <p:style>
+          <a:lnRef idx="1">
+            <a:schemeClr val="accent6"/>
+          </a:lnRef>
+          <a:fillRef idx="2">
+            <a:schemeClr val="accent6"/>
+          </a:fillRef>
+          <a:effectRef idx="1">
+            <a:schemeClr val="accent6"/>
+          </a:effectRef>
+          <a:fontRef idx="minor">
+            <a:schemeClr val="dk1"/>
+          </a:fontRef>
+        </p:style>
+        <p:txBody>
+          <a:bodyPr rtlCol="0" anchor="ctr"/>
+          <a:lstStyle/>
+          <a:p>
+            <a:pPr algn="ctr"/>
+            <a:endParaRPr lang="en-US" sz="1050"/>
+          </a:p>
+        </p:txBody>
+      </p:sp>
+      <p:cxnSp>
+        <p:nvCxnSpPr>
+          <p:cNvPr id="102" name="Elbow Connector 88"/>
+          <p:cNvCxnSpPr/>
+          <p:nvPr/>
+        </p:nvCxnSpPr>
+        <p:spPr>
+          <a:xfrm>
+            <a:off x="5174601" y="1214406"/>
+            <a:ext cx="223200" cy="109"/>
+          </a:xfrm>
+          <a:prstGeom prst="straightConnector1">
+            <a:avLst/>
+          </a:prstGeom>
+          <a:ln w="19050">
+            <a:solidFill>
+              <a:srgbClr val="7030A0"/>
+            </a:solidFill>
+            <a:headEnd type="none" w="med" len="med"/>
+            <a:tailEnd type="arrow" w="med" len="med"/>
+          </a:ln>
+          <a:effectLst/>
+        </p:spPr>
+        <p:style>
+          <a:lnRef idx="1">
+            <a:schemeClr val="accent2"/>
+          </a:lnRef>
+          <a:fillRef idx="2">
+            <a:schemeClr val="accent2"/>
+          </a:fillRef>
+          <a:effectRef idx="1">
+            <a:schemeClr val="accent2"/>
+          </a:effectRef>
+          <a:fontRef idx="minor">
+            <a:schemeClr val="dk1"/>
+          </a:fontRef>
+        </p:style>
+      </p:cxnSp>
+      <p:sp>
+        <p:nvSpPr>
+          <p:cNvPr id="105" name="Rectangle 8"/>
+          <p:cNvSpPr/>
+          <p:nvPr/>
+        </p:nvSpPr>
+        <p:spPr>
+          <a:xfrm>
+            <a:off x="5392033" y="1046853"/>
+            <a:ext cx="632088" cy="352637"/>
+          </a:xfrm>
+          <a:prstGeom prst="rect">
+            <a:avLst/>
+          </a:prstGeom>
+          <a:ln w="19050">
+            <a:solidFill>
+              <a:srgbClr val="7030A0"/>
+            </a:solidFill>
+          </a:ln>
+          <a:effectLst/>
+        </p:spPr>
+        <p:style>
+          <a:lnRef idx="1">
+            <a:schemeClr val="accent4"/>
+          </a:lnRef>
+          <a:fillRef idx="2">
+            <a:schemeClr val="accent4"/>
+          </a:fillRef>
+          <a:effectRef idx="1">
+            <a:schemeClr val="accent4"/>
+          </a:effectRef>
+          <a:fontRef idx="minor">
+            <a:schemeClr val="dk1"/>
+          </a:fontRef>
+        </p:style>
+        <p:txBody>
+          <a:bodyPr rtlCol="0" anchor="ctr"/>
+          <a:lstStyle/>
+          <a:p>
+            <a:pPr algn="ctr"/>
+            <a:r>
+              <a:rPr lang="en-US" sz="1050" dirty="0" smtClean="0">
+                <a:solidFill>
+                  <a:srgbClr val="7030A0"/>
+                </a:solidFill>
+              </a:rPr>
+              <a:t>Task</a:t>
+            </a:r>
+            <a:endParaRPr lang="en-SG" sz="1050" dirty="0">
+              <a:solidFill>
+                <a:srgbClr val="7030A0"/>
+              </a:solidFill>
+            </a:endParaRPr>
+          </a:p>
+        </p:txBody>
+      </p:sp>
+      <p:sp>
+        <p:nvSpPr>
+          <p:cNvPr id="106" name="Flowchart: Decision 96"/>
+          <p:cNvSpPr/>
+          <p:nvPr/>
+        </p:nvSpPr>
+        <p:spPr>
+          <a:xfrm>
+            <a:off x="6042724" y="1128115"/>
+            <a:ext cx="236048" cy="176319"/>
+          </a:xfrm>
+          <a:prstGeom prst="flowChartDecision">
+            <a:avLst/>
+          </a:prstGeom>
+          <a:solidFill>
+            <a:srgbClr val="7030A0"/>
+          </a:solidFill>
+          <a:ln w="19050">
+            <a:solidFill>
+              <a:srgbClr val="7030A0"/>
+            </a:solidFill>
+          </a:ln>
+          <a:effectLst/>
+        </p:spPr>
+        <p:style>
+          <a:lnRef idx="1">
+            <a:schemeClr val="accent6"/>
+          </a:lnRef>
+          <a:fillRef idx="2">
+            <a:schemeClr val="accent6"/>
+          </a:fillRef>
+          <a:effectRef idx="1">
+            <a:schemeClr val="accent6"/>
+          </a:effectRef>
+          <a:fontRef idx="minor">
+            <a:schemeClr val="dk1"/>
+          </a:fontRef>
+        </p:style>
+        <p:txBody>
+          <a:bodyPr rtlCol="0" anchor="ctr"/>
+          <a:lstStyle/>
+          <a:p>
+            <a:pPr algn="ctr"/>
+            <a:endParaRPr lang="en-US" sz="1050"/>
+          </a:p>
+        </p:txBody>
+      </p:sp>
+      <p:sp>
+        <p:nvSpPr>
+          <p:cNvPr id="107" name="Rectangle 8"/>
+          <p:cNvSpPr/>
+          <p:nvPr/>
+        </p:nvSpPr>
+        <p:spPr>
+          <a:xfrm>
+            <a:off x="6660000" y="1064055"/>
+            <a:ext cx="958974" cy="290627"/>
+          </a:xfrm>
+          <a:prstGeom prst="rect">
+            <a:avLst/>
+          </a:prstGeom>
+          <a:ln w="19050">
+            <a:solidFill>
+              <a:srgbClr val="7030A0"/>
+            </a:solidFill>
+          </a:ln>
+          <a:effectLst/>
+        </p:spPr>
+        <p:style>
+          <a:lnRef idx="1">
+            <a:schemeClr val="accent4"/>
+          </a:lnRef>
+          <a:fillRef idx="2">
+            <a:schemeClr val="accent4"/>
+          </a:fillRef>
+          <a:effectRef idx="1">
+            <a:schemeClr val="accent4"/>
+          </a:effectRef>
+          <a:fontRef idx="minor">
+            <a:schemeClr val="dk1"/>
+          </a:fontRef>
+        </p:style>
+        <p:txBody>
+          <a:bodyPr rtlCol="0" anchor="ctr"/>
+          <a:lstStyle/>
+          <a:p>
+            <a:pPr algn="ctr"/>
+            <a:r>
+              <a:rPr lang="en-US" sz="1050" dirty="0" smtClean="0">
+                <a:solidFill>
+                  <a:srgbClr val="7030A0"/>
+                </a:solidFill>
+              </a:rPr>
+              <a:t>Appointment</a:t>
+            </a:r>
+            <a:endParaRPr lang="en-SG" sz="1050" dirty="0">
+              <a:solidFill>
+                <a:srgbClr val="7030A0"/>
+              </a:solidFill>
+            </a:endParaRPr>
+          </a:p>
+        </p:txBody>
+      </p:sp>
+      <p:sp>
+        <p:nvSpPr>
+          <p:cNvPr id="108" name="Rectangle 8"/>
+          <p:cNvSpPr/>
+          <p:nvPr/>
+        </p:nvSpPr>
+        <p:spPr>
+          <a:xfrm>
+            <a:off x="6667891" y="1382569"/>
+            <a:ext cx="960000" cy="290627"/>
+          </a:xfrm>
+          <a:prstGeom prst="rect">
+            <a:avLst/>
+          </a:prstGeom>
+          <a:ln w="19050">
+            <a:solidFill>
+              <a:srgbClr val="7030A0"/>
+            </a:solidFill>
+          </a:ln>
+          <a:effectLst/>
+        </p:spPr>
+        <p:style>
+          <a:lnRef idx="1">
+            <a:schemeClr val="accent4"/>
+          </a:lnRef>
+          <a:fillRef idx="2">
+            <a:schemeClr val="accent4"/>
+          </a:fillRef>
+          <a:effectRef idx="1">
+            <a:schemeClr val="accent4"/>
+          </a:effectRef>
+          <a:fontRef idx="minor">
+            <a:schemeClr val="dk1"/>
+          </a:fontRef>
+        </p:style>
+        <p:txBody>
+          <a:bodyPr rtlCol="0" anchor="ctr"/>
+          <a:lstStyle/>
+          <a:p>
+            <a:pPr algn="ctr"/>
+            <a:r>
+              <a:rPr lang="en-US" sz="1050" dirty="0" smtClean="0">
+                <a:solidFill>
+                  <a:srgbClr val="7030A0"/>
+                </a:solidFill>
+              </a:rPr>
+              <a:t>Date</a:t>
+            </a:r>
+            <a:endParaRPr lang="en-SG" sz="1050" dirty="0">
+              <a:solidFill>
+                <a:srgbClr val="7030A0"/>
+              </a:solidFill>
+            </a:endParaRPr>
+          </a:p>
+        </p:txBody>
+      </p:sp>
+      <p:sp>
+        <p:nvSpPr>
+          <p:cNvPr id="109" name="Rectangle 8"/>
+          <p:cNvSpPr/>
+          <p:nvPr/>
+        </p:nvSpPr>
+        <p:spPr>
+          <a:xfrm>
+            <a:off x="6669537" y="1706182"/>
+            <a:ext cx="956708" cy="290627"/>
+          </a:xfrm>
+          <a:prstGeom prst="rect">
+            <a:avLst/>
+          </a:prstGeom>
+          <a:ln w="19050">
+            <a:solidFill>
+              <a:srgbClr val="7030A0"/>
+            </a:solidFill>
+          </a:ln>
+          <a:effectLst/>
+        </p:spPr>
+        <p:style>
+          <a:lnRef idx="1">
+            <a:schemeClr val="accent4"/>
+          </a:lnRef>
+          <a:fillRef idx="2">
+            <a:schemeClr val="accent4"/>
+          </a:fillRef>
+          <a:effectRef idx="1">
+            <a:schemeClr val="accent4"/>
+          </a:effectRef>
+          <a:fontRef idx="minor">
+            <a:schemeClr val="dk1"/>
+          </a:fontRef>
+        </p:style>
+        <p:txBody>
+          <a:bodyPr rtlCol="0" anchor="ctr"/>
+          <a:lstStyle/>
+          <a:p>
+            <a:pPr algn="ctr"/>
+            <a:r>
+              <a:rPr lang="en-US" sz="1050" dirty="0" err="1" smtClean="0">
+                <a:solidFill>
+                  <a:srgbClr val="7030A0"/>
+                </a:solidFill>
+              </a:rPr>
+              <a:t>StartTime</a:t>
+            </a:r>
+            <a:endParaRPr lang="en-SG" sz="1050" dirty="0">
+              <a:solidFill>
+                <a:srgbClr val="7030A0"/>
+              </a:solidFill>
+            </a:endParaRPr>
+          </a:p>
+        </p:txBody>
+      </p:sp>
+      <p:cxnSp>
+        <p:nvCxnSpPr>
+          <p:cNvPr id="110" name="Straight Connector 109"/>
+          <p:cNvCxnSpPr/>
+          <p:nvPr/>
+        </p:nvCxnSpPr>
+        <p:spPr>
+          <a:xfrm>
+            <a:off x="6279472" y="1209368"/>
+            <a:ext cx="194400" cy="0"/>
+          </a:xfrm>
+          <a:prstGeom prst="line">
+            <a:avLst/>
+          </a:prstGeom>
+          <a:ln w="19050">
+            <a:solidFill>
+              <a:srgbClr val="7030A0"/>
+            </a:solidFill>
+          </a:ln>
+        </p:spPr>
+        <p:style>
+          <a:lnRef idx="1">
+            <a:schemeClr val="accent1"/>
+          </a:lnRef>
+          <a:fillRef idx="0">
+            <a:schemeClr val="accent1"/>
+          </a:fillRef>
+          <a:effectRef idx="0">
+            <a:schemeClr val="accent1"/>
+          </a:effectRef>
+          <a:fontRef idx="minor">
+            <a:schemeClr val="tx1"/>
+          </a:fontRef>
+        </p:style>
+      </p:cxnSp>
+      <p:cxnSp>
+        <p:nvCxnSpPr>
+          <p:cNvPr id="111" name="Straight Connector 110"/>
+          <p:cNvCxnSpPr/>
+          <p:nvPr/>
+        </p:nvCxnSpPr>
+        <p:spPr>
+          <a:xfrm>
+            <a:off x="6473872" y="1187882"/>
+            <a:ext cx="0" cy="724581"/>
+          </a:xfrm>
+          <a:prstGeom prst="line">
+            <a:avLst/>
+          </a:prstGeom>
+          <a:ln w="19050">
+            <a:solidFill>
+              <a:srgbClr val="7030A0"/>
+            </a:solidFill>
+          </a:ln>
+        </p:spPr>
+        <p:style>
+          <a:lnRef idx="1">
+            <a:schemeClr val="accent1"/>
+          </a:lnRef>
+          <a:fillRef idx="0">
+            <a:schemeClr val="accent1"/>
+          </a:fillRef>
+          <a:effectRef idx="0">
+            <a:schemeClr val="accent1"/>
+          </a:effectRef>
+          <a:fontRef idx="minor">
+            <a:schemeClr val="tx1"/>
+          </a:fontRef>
+        </p:style>
+      </p:cxnSp>
+      <p:cxnSp>
+        <p:nvCxnSpPr>
+          <p:cNvPr id="112" name="Elbow Connector 88"/>
+          <p:cNvCxnSpPr/>
+          <p:nvPr/>
+        </p:nvCxnSpPr>
+        <p:spPr>
+          <a:xfrm>
+            <a:off x="6471491" y="1192920"/>
+            <a:ext cx="187200" cy="109"/>
+          </a:xfrm>
+          <a:prstGeom prst="straightConnector1">
+            <a:avLst/>
+          </a:prstGeom>
+          <a:ln w="19050">
+            <a:solidFill>
+              <a:srgbClr val="7030A0"/>
+            </a:solidFill>
+            <a:headEnd type="none" w="med" len="med"/>
+            <a:tailEnd type="arrow" w="med" len="med"/>
+          </a:ln>
+          <a:effectLst/>
+        </p:spPr>
+        <p:style>
+          <a:lnRef idx="1">
+            <a:schemeClr val="accent2"/>
+          </a:lnRef>
+          <a:fillRef idx="2">
+            <a:schemeClr val="accent2"/>
+          </a:fillRef>
+          <a:effectRef idx="1">
+            <a:schemeClr val="accent2"/>
+          </a:effectRef>
+          <a:fontRef idx="minor">
+            <a:schemeClr val="dk1"/>
+          </a:fontRef>
+        </p:style>
+      </p:cxnSp>
+      <p:cxnSp>
+        <p:nvCxnSpPr>
+          <p:cNvPr id="113" name="Elbow Connector 88"/>
+          <p:cNvCxnSpPr/>
+          <p:nvPr/>
+        </p:nvCxnSpPr>
+        <p:spPr>
+          <a:xfrm>
+            <a:off x="6471491" y="1527773"/>
+            <a:ext cx="187200" cy="109"/>
+          </a:xfrm>
+          <a:prstGeom prst="straightConnector1">
+            <a:avLst/>
+          </a:prstGeom>
+          <a:ln w="19050">
+            <a:solidFill>
+              <a:srgbClr val="7030A0"/>
+            </a:solidFill>
+            <a:headEnd type="none" w="med" len="med"/>
+            <a:tailEnd type="arrow" w="med" len="med"/>
+          </a:ln>
+          <a:effectLst/>
+        </p:spPr>
+        <p:style>
+          <a:lnRef idx="1">
+            <a:schemeClr val="accent2"/>
+          </a:lnRef>
+          <a:fillRef idx="2">
+            <a:schemeClr val="accent2"/>
+          </a:fillRef>
+          <a:effectRef idx="1">
+            <a:schemeClr val="accent2"/>
+          </a:effectRef>
+          <a:fontRef idx="minor">
+            <a:schemeClr val="dk1"/>
+          </a:fontRef>
+        </p:style>
+      </p:cxnSp>
+      <p:cxnSp>
+        <p:nvCxnSpPr>
+          <p:cNvPr id="115" name="Elbow Connector 88"/>
+          <p:cNvCxnSpPr/>
+          <p:nvPr/>
+        </p:nvCxnSpPr>
+        <p:spPr>
+          <a:xfrm>
+            <a:off x="6465549" y="1906589"/>
+            <a:ext cx="187200" cy="109"/>
+          </a:xfrm>
+          <a:prstGeom prst="straightConnector1">
+            <a:avLst/>
+          </a:prstGeom>
+          <a:ln w="19050">
+            <a:solidFill>
+              <a:srgbClr val="7030A0"/>
+            </a:solidFill>
+            <a:headEnd type="none" w="med" len="med"/>
+            <a:tailEnd type="arrow" w="med" len="med"/>
+          </a:ln>
+          <a:effectLst/>
+        </p:spPr>
+        <p:style>
+          <a:lnRef idx="1">
+            <a:schemeClr val="accent2"/>
+          </a:lnRef>
+          <a:fillRef idx="2">
+            <a:schemeClr val="accent2"/>
+          </a:fillRef>
+          <a:effectRef idx="1">
+            <a:schemeClr val="accent2"/>
+          </a:effectRef>
+          <a:fontRef idx="minor">
+            <a:schemeClr val="dk1"/>
+          </a:fontRef>
+        </p:style>
+      </p:cxnSp>
+      <p:sp>
+        <p:nvSpPr>
+          <p:cNvPr id="117" name="TextBox 116"/>
+          <p:cNvSpPr txBox="1"/>
+          <p:nvPr/>
+        </p:nvSpPr>
+        <p:spPr>
+          <a:xfrm>
+            <a:off x="3565906" y="1046853"/>
+            <a:ext cx="189257" cy="181712"/>
+          </a:xfrm>
+          <a:prstGeom prst="rect">
+            <a:avLst/>
+          </a:prstGeom>
+          <a:noFill/>
+        </p:spPr>
+        <p:txBody>
+          <a:bodyPr wrap="square" lIns="0" tIns="0" rIns="0" bIns="0" rtlCol="0">
+            <a:noAutofit/>
+          </a:bodyPr>
+          <a:lstStyle/>
+          <a:p>
+            <a:pPr algn="ctr"/>
+            <a:r>
+              <a:rPr lang="en-US" sz="1100" dirty="0" smtClean="0">
+                <a:solidFill>
+                  <a:srgbClr val="7030A0"/>
+                </a:solidFill>
+              </a:rPr>
+              <a:t>1</a:t>
+            </a:r>
+            <a:endParaRPr lang="en-SG" sz="1100" dirty="0">
+              <a:solidFill>
+                <a:srgbClr val="7030A0"/>
+              </a:solidFill>
+            </a:endParaRPr>
+          </a:p>
+        </p:txBody>
+      </p:sp>
+      <p:sp>
+        <p:nvSpPr>
+          <p:cNvPr id="121" name="TextBox 120"/>
+          <p:cNvSpPr txBox="1"/>
+          <p:nvPr/>
+        </p:nvSpPr>
+        <p:spPr>
+          <a:xfrm>
+            <a:off x="5214845" y="1021378"/>
+            <a:ext cx="189257" cy="181712"/>
+          </a:xfrm>
+          <a:prstGeom prst="rect">
+            <a:avLst/>
+          </a:prstGeom>
+          <a:noFill/>
+        </p:spPr>
+        <p:txBody>
+          <a:bodyPr wrap="square" lIns="0" tIns="0" rIns="0" bIns="0" rtlCol="0">
+            <a:noAutofit/>
+          </a:bodyPr>
+          <a:lstStyle/>
+          <a:p>
+            <a:pPr algn="ctr"/>
+            <a:r>
+              <a:rPr lang="en-US" sz="1100" dirty="0">
+                <a:solidFill>
+                  <a:srgbClr val="7030A0"/>
+                </a:solidFill>
+              </a:rPr>
+              <a:t>*</a:t>
             </a:r>
             <a:endParaRPr lang="en-SG" sz="1100" dirty="0">
               <a:solidFill>

</xml_diff>